<commit_message>
Changes from TW's SIM comment.
</commit_message>
<xml_diff>
--- a/docs/deployment_guide/images/Quick Start Ref. Arch.pptx
+++ b/docs/deployment_guide/images/Quick Start Ref. Arch.pptx
@@ -15236,7 +15236,7 @@
         </p:nvSpPr>
         <p:spPr>
           <a:xfrm>
-            <a:off x="1062902" y="3487736"/>
+            <a:off x="788582" y="3131120"/>
             <a:ext cx="2760031" cy="2712603"/>
           </a:xfrm>
           <a:prstGeom prst="rect">
@@ -15308,7 +15308,7 @@
         </p:nvSpPr>
         <p:spPr>
           <a:xfrm>
-            <a:off x="1059585" y="2079842"/>
+            <a:off x="785265" y="1723226"/>
             <a:ext cx="2763348" cy="1266028"/>
           </a:xfrm>
           <a:prstGeom prst="rect">
@@ -15414,7 +15414,7 @@
         </p:nvSpPr>
         <p:spPr bwMode="auto">
           <a:xfrm>
-            <a:off x="512618" y="1716377"/>
+            <a:off x="238298" y="1359761"/>
             <a:ext cx="9694623" cy="4576501"/>
           </a:xfrm>
           <a:prstGeom prst="rect">
@@ -15496,8 +15496,8 @@
         </p:nvSpPr>
         <p:spPr bwMode="auto">
           <a:xfrm>
-            <a:off x="241300" y="546495"/>
-            <a:ext cx="11836400" cy="6160211"/>
+            <a:off x="112014" y="390216"/>
+            <a:ext cx="11967972" cy="6247497"/>
           </a:xfrm>
           <a:prstGeom prst="rect">
             <a:avLst/>
@@ -15546,23 +15546,20 @@
               <a:tabLst/>
               <a:defRPr/>
             </a:pPr>
-            <a:r>
-              <a:rPr kumimoji="0" lang="en-US" sz="1200" b="0" i="0" u="none" strike="noStrike" kern="1200" cap="none" spc="0" normalizeH="0" baseline="0" noProof="0" dirty="0">
-                <a:ln>
-                  <a:noFill/>
-                </a:ln>
-                <a:solidFill>
-                  <a:sysClr val="windowText" lastClr="000000"/>
-                </a:solidFill>
-                <a:effectLst/>
-                <a:uLnTx/>
-                <a:uFillTx/>
-                <a:latin typeface="Arial" panose="020B0604020202020204" pitchFamily="34" charset="0"/>
-                <a:ea typeface="+mn-ea"/>
-                <a:cs typeface="Arial" panose="020B0604020202020204" pitchFamily="34" charset="0"/>
-              </a:rPr>
-              <a:t>AWS Cloud</a:t>
-            </a:r>
+            <a:endParaRPr kumimoji="0" lang="en-US" sz="1200" b="0" i="0" u="none" strike="noStrike" kern="1200" cap="none" spc="0" normalizeH="0" baseline="0" noProof="0" dirty="0">
+              <a:ln>
+                <a:noFill/>
+              </a:ln>
+              <a:solidFill>
+                <a:sysClr val="windowText" lastClr="000000"/>
+              </a:solidFill>
+              <a:effectLst/>
+              <a:uLnTx/>
+              <a:uFillTx/>
+              <a:latin typeface="Arial" panose="020B0604020202020204" pitchFamily="34" charset="0"/>
+              <a:ea typeface="+mn-ea"/>
+              <a:cs typeface="Arial" panose="020B0604020202020204" pitchFamily="34" charset="0"/>
+            </a:endParaRPr>
           </a:p>
         </p:txBody>
       </p:sp>
@@ -15580,7 +15577,7 @@
         </p:nvSpPr>
         <p:spPr bwMode="auto">
           <a:xfrm>
-            <a:off x="974414" y="1400096"/>
+            <a:off x="700094" y="1043480"/>
             <a:ext cx="2990308" cy="5041433"/>
           </a:xfrm>
           <a:prstGeom prst="rect">
@@ -15667,7 +15664,7 @@
         </p:nvSpPr>
         <p:spPr bwMode="auto">
           <a:xfrm>
-            <a:off x="1387158" y="2909633"/>
+            <a:off x="1112838" y="2553017"/>
             <a:ext cx="1767152" cy="246221"/>
           </a:xfrm>
           <a:prstGeom prst="rect">
@@ -15853,7 +15850,7 @@
         </p:nvSpPr>
         <p:spPr bwMode="auto">
           <a:xfrm>
-            <a:off x="2695130" y="4532494"/>
+            <a:off x="2420810" y="4175878"/>
             <a:ext cx="1307913" cy="246221"/>
           </a:xfrm>
           <a:prstGeom prst="rect">
@@ -16050,7 +16047,7 @@
         </p:blipFill>
         <p:spPr>
           <a:xfrm>
-            <a:off x="241300" y="546496"/>
+            <a:off x="122428" y="400192"/>
             <a:ext cx="381000" cy="381000"/>
           </a:xfrm>
           <a:prstGeom prst="rect">
@@ -16086,7 +16083,7 @@
         </p:blipFill>
         <p:spPr>
           <a:xfrm>
-            <a:off x="512618" y="1725184"/>
+            <a:off x="238298" y="1368568"/>
             <a:ext cx="381000" cy="381000"/>
           </a:xfrm>
           <a:prstGeom prst="rect">
@@ -16108,7 +16105,7 @@
         </p:nvSpPr>
         <p:spPr>
           <a:xfrm>
-            <a:off x="2733141" y="2390955"/>
+            <a:off x="2458821" y="2034339"/>
             <a:ext cx="5494139" cy="753131"/>
           </a:xfrm>
           <a:prstGeom prst="rect">
@@ -16245,82 +16242,12 @@
           </a:p>
         </p:txBody>
       </p:sp>
-      <p:sp>
-        <p:nvSpPr>
-          <p:cNvPr id="44" name="Rectangle 43">
-            <a:extLst>
-              <a:ext uri="{FF2B5EF4-FFF2-40B4-BE49-F238E27FC236}">
-                <a16:creationId xmlns:a16="http://schemas.microsoft.com/office/drawing/2014/main" id="{4537C86D-7502-434C-AB1C-77DB11C905B6}"/>
-              </a:ext>
-            </a:extLst>
-          </p:cNvPr>
-          <p:cNvSpPr/>
-          <p:nvPr/>
-        </p:nvSpPr>
-        <p:spPr>
-          <a:xfrm>
-            <a:off x="301625" y="976854"/>
-            <a:ext cx="11712575" cy="5614446"/>
-          </a:xfrm>
-          <a:prstGeom prst="rect">
-            <a:avLst/>
-          </a:prstGeom>
-          <a:noFill/>
-          <a:ln w="12700">
-            <a:solidFill>
-              <a:srgbClr val="5B9CD5"/>
-            </a:solidFill>
-            <a:prstDash val="sysDash"/>
-          </a:ln>
-        </p:spPr>
-        <p:style>
-          <a:lnRef idx="2">
-            <a:schemeClr val="accent1">
-              <a:shade val="50000"/>
-            </a:schemeClr>
-          </a:lnRef>
-          <a:fillRef idx="1">
-            <a:schemeClr val="accent1"/>
-          </a:fillRef>
-          <a:effectRef idx="0">
-            <a:schemeClr val="accent1"/>
-          </a:effectRef>
-          <a:fontRef idx="minor">
-            <a:schemeClr val="lt1"/>
-          </a:fontRef>
-        </p:style>
-        <p:txBody>
-          <a:bodyPr lIns="502920" tIns="91440"/>
-          <a:lstStyle/>
-          <a:p>
-            <a:pPr eaLnBrk="1" fontAlgn="auto" hangingPunct="1">
-              <a:spcBef>
-                <a:spcPts val="0"/>
-              </a:spcBef>
-              <a:spcAft>
-                <a:spcPts val="0"/>
-              </a:spcAft>
-              <a:defRPr/>
-            </a:pPr>
-            <a:r>
-              <a:rPr lang="en-US" sz="1200" dirty="0">
-                <a:solidFill>
-                  <a:srgbClr val="5B9CD5"/>
-                </a:solidFill>
-                <a:latin typeface="Arial" panose="020B0604020202020204" pitchFamily="34" charset="0"/>
-                <a:cs typeface="Arial" panose="020B0604020202020204" pitchFamily="34" charset="0"/>
-              </a:rPr>
-              <a:t>Region</a:t>
-            </a:r>
-          </a:p>
-        </p:txBody>
-      </p:sp>
       <p:pic>
         <p:nvPicPr>
-          <p:cNvPr id="46" name="Graphic 45">
-            <a:extLst>
-              <a:ext uri="{FF2B5EF4-FFF2-40B4-BE49-F238E27FC236}">
-                <a16:creationId xmlns:a16="http://schemas.microsoft.com/office/drawing/2014/main" id="{3BD774D2-D444-9F41-8C2D-95BD2DA8A293}"/>
+          <p:cNvPr id="49" name="Graphic 48">
+            <a:extLst>
+              <a:ext uri="{FF2B5EF4-FFF2-40B4-BE49-F238E27FC236}">
+                <a16:creationId xmlns:a16="http://schemas.microsoft.com/office/drawing/2014/main" id="{F88FDB8F-EE69-CA4C-BA7D-77D1617E7A7A}"/>
               </a:ext>
             </a:extLst>
           </p:cNvPr>
@@ -16343,8 +16270,8 @@
         </p:blipFill>
         <p:spPr>
           <a:xfrm>
-            <a:off x="301625" y="987821"/>
-            <a:ext cx="381000" cy="381000"/>
+            <a:off x="785900" y="1737978"/>
+            <a:ext cx="295194" cy="295194"/>
           </a:xfrm>
           <a:prstGeom prst="rect">
             <a:avLst/>
@@ -16353,10 +16280,10 @@
       </p:pic>
       <p:pic>
         <p:nvPicPr>
-          <p:cNvPr id="49" name="Graphic 48">
-            <a:extLst>
-              <a:ext uri="{FF2B5EF4-FFF2-40B4-BE49-F238E27FC236}">
-                <a16:creationId xmlns:a16="http://schemas.microsoft.com/office/drawing/2014/main" id="{F88FDB8F-EE69-CA4C-BA7D-77D1617E7A7A}"/>
+          <p:cNvPr id="50" name="Graphic 49">
+            <a:extLst>
+              <a:ext uri="{FF2B5EF4-FFF2-40B4-BE49-F238E27FC236}">
+                <a16:creationId xmlns:a16="http://schemas.microsoft.com/office/drawing/2014/main" id="{99CEE759-5B3C-F34D-A7E1-8309D1A608E9}"/>
               </a:ext>
             </a:extLst>
           </p:cNvPr>
@@ -16379,43 +16306,7 @@
         </p:blipFill>
         <p:spPr>
           <a:xfrm>
-            <a:off x="1060220" y="2094594"/>
-            <a:ext cx="295194" cy="295194"/>
-          </a:xfrm>
-          <a:prstGeom prst="rect">
-            <a:avLst/>
-          </a:prstGeom>
-        </p:spPr>
-      </p:pic>
-      <p:pic>
-        <p:nvPicPr>
-          <p:cNvPr id="50" name="Graphic 49">
-            <a:extLst>
-              <a:ext uri="{FF2B5EF4-FFF2-40B4-BE49-F238E27FC236}">
-                <a16:creationId xmlns:a16="http://schemas.microsoft.com/office/drawing/2014/main" id="{99CEE759-5B3C-F34D-A7E1-8309D1A608E9}"/>
-              </a:ext>
-            </a:extLst>
-          </p:cNvPr>
-          <p:cNvPicPr>
-            <a:picLocks noChangeAspect="1"/>
-          </p:cNvPicPr>
-          <p:nvPr/>
-        </p:nvPicPr>
-        <p:blipFill>
-          <a:blip r:embed="rId10">
-            <a:extLst>
-              <a:ext uri="{96DAC541-7B7A-43D3-8B79-37D633B846F1}">
-                <asvg:svgBlip xmlns:asvg="http://schemas.microsoft.com/office/drawing/2016/SVG/main" r:embed="rId11"/>
-              </a:ext>
-            </a:extLst>
-          </a:blip>
-          <a:stretch>
-            <a:fillRect/>
-          </a:stretch>
-        </p:blipFill>
-        <p:spPr>
-          <a:xfrm>
-            <a:off x="1049425" y="3489581"/>
+            <a:off x="775105" y="3132965"/>
             <a:ext cx="381000" cy="381000"/>
           </a:xfrm>
           <a:prstGeom prst="rect">
@@ -16437,7 +16328,7 @@
         </p:nvSpPr>
         <p:spPr>
           <a:xfrm>
-            <a:off x="7205675" y="3449247"/>
+            <a:off x="6931355" y="3092631"/>
             <a:ext cx="2760031" cy="2712603"/>
           </a:xfrm>
           <a:prstGeom prst="rect">
@@ -16509,7 +16400,7 @@
         </p:nvSpPr>
         <p:spPr>
           <a:xfrm>
-            <a:off x="7202358" y="1963766"/>
+            <a:off x="6928038" y="1607150"/>
             <a:ext cx="2763348" cy="1343616"/>
           </a:xfrm>
           <a:prstGeom prst="rect">
@@ -16581,7 +16472,7 @@
         </p:nvSpPr>
         <p:spPr bwMode="auto">
           <a:xfrm>
-            <a:off x="7144683" y="1419621"/>
+            <a:off x="6870363" y="1063005"/>
             <a:ext cx="2962812" cy="5019228"/>
           </a:xfrm>
           <a:prstGeom prst="rect">
@@ -16668,7 +16559,7 @@
         </p:nvSpPr>
         <p:spPr bwMode="auto">
           <a:xfrm>
-            <a:off x="8429364" y="2817716"/>
+            <a:off x="8155044" y="2461100"/>
             <a:ext cx="1767152" cy="246221"/>
           </a:xfrm>
           <a:prstGeom prst="rect">
@@ -16854,7 +16745,7 @@
         </p:nvSpPr>
         <p:spPr bwMode="auto">
           <a:xfrm>
-            <a:off x="8410855" y="4498336"/>
+            <a:off x="8136535" y="4141720"/>
             <a:ext cx="1767152" cy="246221"/>
           </a:xfrm>
           <a:prstGeom prst="rect">
@@ -17039,10 +16930,10 @@
           <p:nvPr/>
         </p:nvPicPr>
         <p:blipFill>
-          <a:blip r:embed="rId8">
+          <a:blip r:embed="rId6">
             <a:extLst>
               <a:ext uri="{96DAC541-7B7A-43D3-8B79-37D633B846F1}">
-                <asvg:svgBlip xmlns:asvg="http://schemas.microsoft.com/office/drawing/2016/SVG/main" r:embed="rId9"/>
+                <asvg:svgBlip xmlns:asvg="http://schemas.microsoft.com/office/drawing/2016/SVG/main" r:embed="rId7"/>
               </a:ext>
             </a:extLst>
           </a:blip>
@@ -17052,7 +16943,7 @@
         </p:blipFill>
         <p:spPr>
           <a:xfrm>
-            <a:off x="7202993" y="1972979"/>
+            <a:off x="6928673" y="1616363"/>
             <a:ext cx="309246" cy="309246"/>
           </a:xfrm>
           <a:prstGeom prst="rect">
@@ -17075,10 +16966,10 @@
           <p:nvPr/>
         </p:nvPicPr>
         <p:blipFill>
-          <a:blip r:embed="rId10">
+          <a:blip r:embed="rId8">
             <a:extLst>
               <a:ext uri="{96DAC541-7B7A-43D3-8B79-37D633B846F1}">
-                <asvg:svgBlip xmlns:asvg="http://schemas.microsoft.com/office/drawing/2016/SVG/main" r:embed="rId11"/>
+                <asvg:svgBlip xmlns:asvg="http://schemas.microsoft.com/office/drawing/2016/SVG/main" r:embed="rId9"/>
               </a:ext>
             </a:extLst>
           </a:blip>
@@ -17088,7 +16979,7 @@
         </p:blipFill>
         <p:spPr>
           <a:xfrm>
-            <a:off x="7192198" y="3451092"/>
+            <a:off x="6917878" y="3094476"/>
             <a:ext cx="381000" cy="381000"/>
           </a:xfrm>
           <a:prstGeom prst="rect">
@@ -17112,7 +17003,7 @@
         </p:nvSpPr>
         <p:spPr bwMode="auto">
           <a:xfrm>
-            <a:off x="4840204" y="1903346"/>
+            <a:off x="4565884" y="1546730"/>
             <a:ext cx="1403350" cy="246221"/>
           </a:xfrm>
           <a:prstGeom prst="rect">
@@ -17273,7 +17164,7 @@
         </p:nvSpPr>
         <p:spPr bwMode="auto">
           <a:xfrm>
-            <a:off x="833922" y="4433407"/>
+            <a:off x="559602" y="4076791"/>
             <a:ext cx="1767152" cy="246221"/>
           </a:xfrm>
           <a:prstGeom prst="rect">
@@ -17459,7 +17350,7 @@
         </p:nvSpPr>
         <p:spPr bwMode="auto">
           <a:xfrm>
-            <a:off x="7031969" y="4521835"/>
+            <a:off x="6757649" y="4165219"/>
             <a:ext cx="1434306" cy="246221"/>
           </a:xfrm>
           <a:prstGeom prst="rect">
@@ -17644,7 +17535,7 @@
           <p:nvPr/>
         </p:nvPicPr>
         <p:blipFill>
-          <a:blip r:embed="rId12">
+          <a:blip r:embed="rId10">
             <a:extLst>
               <a:ext uri="{28A0092B-C50C-407E-A947-70E740481C1C}">
                 <a14:useLocalDpi xmlns:a14="http://schemas.microsoft.com/office/drawing/2010/main" val="0"/>
@@ -17658,7 +17549,7 @@
         </p:blipFill>
         <p:spPr bwMode="auto">
           <a:xfrm>
-            <a:off x="3060128" y="2453998"/>
+            <a:off x="2785808" y="2097382"/>
             <a:ext cx="469900" cy="469900"/>
           </a:xfrm>
           <a:prstGeom prst="rect">
@@ -17705,7 +17596,7 @@
         </p:nvSpPr>
         <p:spPr bwMode="auto">
           <a:xfrm>
-            <a:off x="2411119" y="2899368"/>
+            <a:off x="2136799" y="2542752"/>
             <a:ext cx="1767152" cy="246221"/>
           </a:xfrm>
           <a:prstGeom prst="rect">
@@ -17890,7 +17781,7 @@
           <p:nvPr/>
         </p:nvPicPr>
         <p:blipFill>
-          <a:blip r:embed="rId12">
+          <a:blip r:embed="rId10">
             <a:extLst>
               <a:ext uri="{28A0092B-C50C-407E-A947-70E740481C1C}">
                 <a14:useLocalDpi xmlns:a14="http://schemas.microsoft.com/office/drawing/2010/main" val="0"/>
@@ -17904,7 +17795,7 @@
         </p:blipFill>
         <p:spPr bwMode="auto">
           <a:xfrm>
-            <a:off x="7462847" y="2415109"/>
+            <a:off x="7188527" y="2058493"/>
             <a:ext cx="469900" cy="469900"/>
           </a:xfrm>
           <a:prstGeom prst="rect">
@@ -17951,7 +17842,7 @@
         </p:nvSpPr>
         <p:spPr bwMode="auto">
           <a:xfrm>
-            <a:off x="6813838" y="2860479"/>
+            <a:off x="6539518" y="2503863"/>
             <a:ext cx="1767152" cy="246221"/>
           </a:xfrm>
           <a:prstGeom prst="rect">
@@ -18135,7 +18026,7 @@
         </p:nvSpPr>
         <p:spPr>
           <a:xfrm>
-            <a:off x="2769062" y="4058930"/>
+            <a:off x="2494742" y="3702314"/>
             <a:ext cx="5500004" cy="734347"/>
           </a:xfrm>
           <a:prstGeom prst="rect">
@@ -18288,7 +18179,7 @@
         </p:nvSpPr>
         <p:spPr bwMode="auto">
           <a:xfrm>
-            <a:off x="4886655" y="3646820"/>
+            <a:off x="4612335" y="3290204"/>
             <a:ext cx="1255028" cy="400110"/>
           </a:xfrm>
           <a:prstGeom prst="rect">
@@ -18464,7 +18355,7 @@
         </p:nvCxnSpPr>
         <p:spPr bwMode="auto">
           <a:xfrm>
-            <a:off x="5783302" y="5408274"/>
+            <a:off x="5508982" y="5051658"/>
             <a:ext cx="1579393" cy="0"/>
           </a:xfrm>
           <a:prstGeom prst="straightConnector1">
@@ -18509,7 +18400,7 @@
         </p:nvCxnSpPr>
         <p:spPr bwMode="auto">
           <a:xfrm>
-            <a:off x="3696429" y="5408274"/>
+            <a:off x="3422109" y="5051658"/>
             <a:ext cx="1564001" cy="0"/>
           </a:xfrm>
           <a:prstGeom prst="straightConnector1">
@@ -18553,7 +18444,7 @@
           <p:nvPr/>
         </p:nvPicPr>
         <p:blipFill>
-          <a:blip r:embed="rId13">
+          <a:blip r:embed="rId11">
             <a:extLst>
               <a:ext uri="{28A0092B-C50C-407E-A947-70E740481C1C}">
                 <a14:useLocalDpi xmlns:a14="http://schemas.microsoft.com/office/drawing/2010/main" val="0"/>
@@ -18567,7 +18458,7 @@
         </p:blipFill>
         <p:spPr bwMode="auto">
           <a:xfrm>
-            <a:off x="2028202" y="2451000"/>
+            <a:off x="1753882" y="2094384"/>
             <a:ext cx="469900" cy="469900"/>
           </a:xfrm>
           <a:prstGeom prst="rect">
@@ -18613,10 +18504,10 @@
           <p:nvPr/>
         </p:nvPicPr>
         <p:blipFill>
-          <a:blip r:embed="rId14">
+          <a:blip r:embed="rId12">
             <a:extLst>
               <a:ext uri="{96DAC541-7B7A-43D3-8B79-37D633B846F1}">
-                <asvg:svgBlip xmlns:asvg="http://schemas.microsoft.com/office/drawing/2016/SVG/main" r:embed="rId15"/>
+                <asvg:svgBlip xmlns:asvg="http://schemas.microsoft.com/office/drawing/2016/SVG/main" r:embed="rId13"/>
               </a:ext>
             </a:extLst>
           </a:blip>
@@ -18626,7 +18517,7 @@
         </p:blipFill>
         <p:spPr>
           <a:xfrm>
-            <a:off x="5257278" y="2385869"/>
+            <a:off x="4982958" y="2029253"/>
             <a:ext cx="381000" cy="381000"/>
           </a:xfrm>
           <a:prstGeom prst="rect">
@@ -18649,10 +18540,10 @@
           <p:nvPr/>
         </p:nvPicPr>
         <p:blipFill>
-          <a:blip r:embed="rId14">
+          <a:blip r:embed="rId12">
             <a:extLst>
               <a:ext uri="{96DAC541-7B7A-43D3-8B79-37D633B846F1}">
-                <asvg:svgBlip xmlns:asvg="http://schemas.microsoft.com/office/drawing/2016/SVG/main" r:embed="rId15"/>
+                <asvg:svgBlip xmlns:asvg="http://schemas.microsoft.com/office/drawing/2016/SVG/main" r:embed="rId13"/>
               </a:ext>
             </a:extLst>
           </a:blip>
@@ -18662,7 +18553,7 @@
         </p:blipFill>
         <p:spPr>
           <a:xfrm>
-            <a:off x="5351379" y="4069136"/>
+            <a:off x="5077059" y="3712520"/>
             <a:ext cx="381000" cy="381000"/>
           </a:xfrm>
           <a:prstGeom prst="rect">
@@ -18685,7 +18576,7 @@
           <p:nvPr/>
         </p:nvPicPr>
         <p:blipFill>
-          <a:blip r:embed="rId13">
+          <a:blip r:embed="rId11">
             <a:extLst>
               <a:ext uri="{28A0092B-C50C-407E-A947-70E740481C1C}">
                 <a14:useLocalDpi xmlns:a14="http://schemas.microsoft.com/office/drawing/2010/main" val="0"/>
@@ -18699,7 +18590,7 @@
         </p:blipFill>
         <p:spPr bwMode="auto">
           <a:xfrm>
-            <a:off x="8988959" y="2343396"/>
+            <a:off x="8714639" y="1986780"/>
             <a:ext cx="469900" cy="469900"/>
           </a:xfrm>
           <a:prstGeom prst="rect">
@@ -18745,7 +18636,7 @@
           <p:nvPr/>
         </p:nvPicPr>
         <p:blipFill>
-          <a:blip r:embed="rId12">
+          <a:blip r:embed="rId10">
             <a:extLst>
               <a:ext uri="{28A0092B-C50C-407E-A947-70E740481C1C}">
                 <a14:useLocalDpi xmlns:a14="http://schemas.microsoft.com/office/drawing/2010/main" val="0"/>
@@ -18759,7 +18650,7 @@
         </p:blipFill>
         <p:spPr bwMode="auto">
           <a:xfrm>
-            <a:off x="7422211" y="4039707"/>
+            <a:off x="7147891" y="3683091"/>
             <a:ext cx="469900" cy="469900"/>
           </a:xfrm>
           <a:prstGeom prst="rect">
@@ -18805,7 +18696,7 @@
           <p:nvPr/>
         </p:nvPicPr>
         <p:blipFill>
-          <a:blip r:embed="rId12">
+          <a:blip r:embed="rId10">
             <a:extLst>
               <a:ext uri="{28A0092B-C50C-407E-A947-70E740481C1C}">
                 <a14:useLocalDpi xmlns:a14="http://schemas.microsoft.com/office/drawing/2010/main" val="0"/>
@@ -18819,7 +18710,7 @@
         </p:blipFill>
         <p:spPr bwMode="auto">
           <a:xfrm>
-            <a:off x="9059481" y="3998523"/>
+            <a:off x="8785161" y="3641907"/>
             <a:ext cx="469900" cy="469900"/>
           </a:xfrm>
           <a:prstGeom prst="rect">
@@ -18865,7 +18756,7 @@
           <p:nvPr/>
         </p:nvPicPr>
         <p:blipFill>
-          <a:blip r:embed="rId12">
+          <a:blip r:embed="rId10">
             <a:extLst>
               <a:ext uri="{28A0092B-C50C-407E-A947-70E740481C1C}">
                 <a14:useLocalDpi xmlns:a14="http://schemas.microsoft.com/office/drawing/2010/main" val="0"/>
@@ -18879,7 +18770,7 @@
         </p:blipFill>
         <p:spPr bwMode="auto">
           <a:xfrm>
-            <a:off x="3064487" y="4065234"/>
+            <a:off x="2790167" y="3708618"/>
             <a:ext cx="469900" cy="469900"/>
           </a:xfrm>
           <a:prstGeom prst="rect">
@@ -18925,7 +18816,7 @@
           <p:nvPr/>
         </p:nvPicPr>
         <p:blipFill>
-          <a:blip r:embed="rId12">
+          <a:blip r:embed="rId10">
             <a:extLst>
               <a:ext uri="{28A0092B-C50C-407E-A947-70E740481C1C}">
                 <a14:useLocalDpi xmlns:a14="http://schemas.microsoft.com/office/drawing/2010/main" val="0"/>
@@ -18939,7 +18830,7 @@
         </p:blipFill>
         <p:spPr bwMode="auto">
           <a:xfrm>
-            <a:off x="1307940" y="3975735"/>
+            <a:off x="1033620" y="3619119"/>
             <a:ext cx="469900" cy="469900"/>
           </a:xfrm>
           <a:prstGeom prst="rect">
@@ -18985,7 +18876,7 @@
           <p:nvPr/>
         </p:nvPicPr>
         <p:blipFill>
-          <a:blip r:embed="rId16">
+          <a:blip r:embed="rId14">
             <a:extLst>
               <a:ext uri="{28A0092B-C50C-407E-A947-70E740481C1C}">
                 <a14:useLocalDpi xmlns:a14="http://schemas.microsoft.com/office/drawing/2010/main" val="0"/>
@@ -18999,7 +18890,7 @@
         </p:blipFill>
         <p:spPr bwMode="auto">
           <a:xfrm>
-            <a:off x="5313279" y="1504383"/>
+            <a:off x="5038959" y="1147767"/>
             <a:ext cx="457200" cy="457200"/>
           </a:xfrm>
           <a:prstGeom prst="rect">
@@ -19045,7 +18936,7 @@
           <p:nvPr/>
         </p:nvPicPr>
         <p:blipFill>
-          <a:blip r:embed="rId17">
+          <a:blip r:embed="rId15">
             <a:extLst>
               <a:ext uri="{28A0092B-C50C-407E-A947-70E740481C1C}">
                 <a14:useLocalDpi xmlns:a14="http://schemas.microsoft.com/office/drawing/2010/main" val="0"/>
@@ -19059,7 +18950,7 @@
         </p:blipFill>
         <p:spPr bwMode="auto">
           <a:xfrm>
-            <a:off x="5290464" y="3222215"/>
+            <a:off x="5016144" y="2865599"/>
             <a:ext cx="457200" cy="457200"/>
           </a:xfrm>
           <a:prstGeom prst="rect">
@@ -19105,7 +18996,7 @@
           <p:nvPr/>
         </p:nvPicPr>
         <p:blipFill>
-          <a:blip r:embed="rId18">
+          <a:blip r:embed="rId16">
             <a:extLst>
               <a:ext uri="{28A0092B-C50C-407E-A947-70E740481C1C}">
                 <a14:useLocalDpi xmlns:a14="http://schemas.microsoft.com/office/drawing/2010/main" val="0"/>
@@ -19119,7 +19010,7 @@
         </p:blipFill>
         <p:spPr bwMode="auto">
           <a:xfrm>
-            <a:off x="1241389" y="4936356"/>
+            <a:off x="967069" y="4579740"/>
             <a:ext cx="762000" cy="762000"/>
           </a:xfrm>
           <a:prstGeom prst="rect">
@@ -19166,7 +19057,7 @@
         </p:nvSpPr>
         <p:spPr bwMode="auto">
           <a:xfrm>
-            <a:off x="492089" y="5699943"/>
+            <a:off x="217769" y="5343327"/>
             <a:ext cx="2243137" cy="276999"/>
           </a:xfrm>
           <a:prstGeom prst="rect">
@@ -19326,7 +19217,7 @@
           <p:nvPr/>
         </p:nvPicPr>
         <p:blipFill>
-          <a:blip r:embed="rId19">
+          <a:blip r:embed="rId17">
             <a:extLst>
               <a:ext uri="{28A0092B-C50C-407E-A947-70E740481C1C}">
                 <a14:useLocalDpi xmlns:a14="http://schemas.microsoft.com/office/drawing/2010/main" val="0"/>
@@ -19340,7 +19231,7 @@
         </p:blipFill>
         <p:spPr bwMode="auto">
           <a:xfrm>
-            <a:off x="2666498" y="4957559"/>
+            <a:off x="2392178" y="4600943"/>
             <a:ext cx="762000" cy="762000"/>
           </a:xfrm>
           <a:prstGeom prst="rect">
@@ -19387,7 +19278,7 @@
         </p:nvSpPr>
         <p:spPr bwMode="auto">
           <a:xfrm>
-            <a:off x="1909261" y="5717971"/>
+            <a:off x="1634941" y="5361355"/>
             <a:ext cx="2292350" cy="276999"/>
           </a:xfrm>
           <a:prstGeom prst="rect">
@@ -19547,7 +19438,7 @@
           <p:nvPr/>
         </p:nvPicPr>
         <p:blipFill>
-          <a:blip r:embed="rId19">
+          <a:blip r:embed="rId17">
             <a:extLst>
               <a:ext uri="{28A0092B-C50C-407E-A947-70E740481C1C}">
                 <a14:useLocalDpi xmlns:a14="http://schemas.microsoft.com/office/drawing/2010/main" val="0"/>
@@ -19561,7 +19452,7 @@
         </p:blipFill>
         <p:spPr bwMode="auto">
           <a:xfrm>
-            <a:off x="7645802" y="4984738"/>
+            <a:off x="7371482" y="4628122"/>
             <a:ext cx="762000" cy="762000"/>
           </a:xfrm>
           <a:prstGeom prst="rect">
@@ -19608,7 +19499,7 @@
         </p:nvSpPr>
         <p:spPr bwMode="auto">
           <a:xfrm>
-            <a:off x="6888565" y="5745150"/>
+            <a:off x="6614245" y="5388534"/>
             <a:ext cx="2292350" cy="276999"/>
           </a:xfrm>
           <a:prstGeom prst="rect">
@@ -19769,7 +19660,7 @@
         </p:nvSpPr>
         <p:spPr bwMode="auto">
           <a:xfrm>
-            <a:off x="4824330" y="5661757"/>
+            <a:off x="4550010" y="5305141"/>
             <a:ext cx="1343025" cy="261610"/>
           </a:xfrm>
           <a:prstGeom prst="rect">
@@ -19929,7 +19820,7 @@
           <p:nvPr/>
         </p:nvPicPr>
         <p:blipFill>
-          <a:blip r:embed="rId20">
+          <a:blip r:embed="rId18">
             <a:extLst>
               <a:ext uri="{28A0092B-C50C-407E-A947-70E740481C1C}">
                 <a14:useLocalDpi xmlns:a14="http://schemas.microsoft.com/office/drawing/2010/main" val="0"/>
@@ -19943,7 +19834,7 @@
         </p:blipFill>
         <p:spPr bwMode="auto">
           <a:xfrm>
-            <a:off x="5286568" y="5204557"/>
+            <a:off x="5012248" y="4847941"/>
             <a:ext cx="457200" cy="457200"/>
           </a:xfrm>
           <a:prstGeom prst="rect">
@@ -19989,7 +19880,7 @@
           <p:nvPr/>
         </p:nvPicPr>
         <p:blipFill>
-          <a:blip r:embed="rId21">
+          <a:blip r:embed="rId19">
             <a:extLst>
               <a:ext uri="{28A0092B-C50C-407E-A947-70E740481C1C}">
                 <a14:useLocalDpi xmlns:a14="http://schemas.microsoft.com/office/drawing/2010/main" val="0"/>
@@ -20210,7 +20101,7 @@
           <p:nvPr/>
         </p:nvPicPr>
         <p:blipFill>
-          <a:blip r:embed="rId22">
+          <a:blip r:embed="rId20">
             <a:extLst>
               <a:ext uri="{28A0092B-C50C-407E-A947-70E740481C1C}">
                 <a14:useLocalDpi xmlns:a14="http://schemas.microsoft.com/office/drawing/2010/main" val="0"/>
@@ -20431,7 +20322,7 @@
           <p:nvPr/>
         </p:nvPicPr>
         <p:blipFill>
-          <a:blip r:embed="rId23">
+          <a:blip r:embed="rId21">
             <a:extLst>
               <a:ext uri="{28A0092B-C50C-407E-A947-70E740481C1C}">
                 <a14:useLocalDpi xmlns:a14="http://schemas.microsoft.com/office/drawing/2010/main" val="0"/>
@@ -20652,7 +20543,7 @@
           <p:nvPr/>
         </p:nvPicPr>
         <p:blipFill>
-          <a:blip r:embed="rId24">
+          <a:blip r:embed="rId22">
             <a:extLst>
               <a:ext uri="{28A0092B-C50C-407E-A947-70E740481C1C}">
                 <a14:useLocalDpi xmlns:a14="http://schemas.microsoft.com/office/drawing/2010/main" val="0"/>
@@ -20873,7 +20764,7 @@
           <p:nvPr/>
         </p:nvPicPr>
         <p:blipFill>
-          <a:blip r:embed="rId25">
+          <a:blip r:embed="rId23">
             <a:extLst>
               <a:ext uri="{28A0092B-C50C-407E-A947-70E740481C1C}">
                 <a14:useLocalDpi xmlns:a14="http://schemas.microsoft.com/office/drawing/2010/main" val="0"/>
@@ -21625,23 +21516,20 @@
               <a:tabLst/>
               <a:defRPr/>
             </a:pPr>
-            <a:r>
-              <a:rPr kumimoji="0" lang="en-US" sz="1200" b="0" i="0" u="none" strike="noStrike" kern="1200" cap="none" spc="0" normalizeH="0" baseline="0" noProof="0" dirty="0">
-                <a:ln>
-                  <a:noFill/>
-                </a:ln>
-                <a:solidFill>
-                  <a:sysClr val="windowText" lastClr="000000"/>
-                </a:solidFill>
-                <a:effectLst/>
-                <a:uLnTx/>
-                <a:uFillTx/>
-                <a:latin typeface="Arial" panose="020B0604020202020204" pitchFamily="34" charset="0"/>
-                <a:ea typeface="+mn-ea"/>
-                <a:cs typeface="Arial" panose="020B0604020202020204" pitchFamily="34" charset="0"/>
-              </a:rPr>
-              <a:t>AWS Cloud</a:t>
-            </a:r>
+            <a:endParaRPr kumimoji="0" lang="en-US" sz="1200" b="0" i="0" u="none" strike="noStrike" kern="1200" cap="none" spc="0" normalizeH="0" baseline="0" noProof="0" dirty="0">
+              <a:ln>
+                <a:noFill/>
+              </a:ln>
+              <a:solidFill>
+                <a:sysClr val="windowText" lastClr="000000"/>
+              </a:solidFill>
+              <a:effectLst/>
+              <a:uLnTx/>
+              <a:uFillTx/>
+              <a:latin typeface="Arial" panose="020B0604020202020204" pitchFamily="34" charset="0"/>
+              <a:ea typeface="+mn-ea"/>
+              <a:cs typeface="Arial" panose="020B0604020202020204" pitchFamily="34" charset="0"/>
+            </a:endParaRPr>
           </a:p>
         </p:txBody>
       </p:sp>
@@ -22324,82 +22212,12 @@
           </a:p>
         </p:txBody>
       </p:sp>
-      <p:sp>
-        <p:nvSpPr>
-          <p:cNvPr id="17" name="Rectangle 16">
-            <a:extLst>
-              <a:ext uri="{FF2B5EF4-FFF2-40B4-BE49-F238E27FC236}">
-                <a16:creationId xmlns:a16="http://schemas.microsoft.com/office/drawing/2014/main" id="{225A4F25-4834-AF6E-36DF-39B606D89E2B}"/>
-              </a:ext>
-            </a:extLst>
-          </p:cNvPr>
-          <p:cNvSpPr/>
-          <p:nvPr/>
-        </p:nvSpPr>
-        <p:spPr>
-          <a:xfrm>
-            <a:off x="301625" y="976854"/>
-            <a:ext cx="11712575" cy="5614446"/>
-          </a:xfrm>
-          <a:prstGeom prst="rect">
-            <a:avLst/>
-          </a:prstGeom>
-          <a:noFill/>
-          <a:ln w="12700">
-            <a:solidFill>
-              <a:srgbClr val="5B9CD5"/>
-            </a:solidFill>
-            <a:prstDash val="sysDash"/>
-          </a:ln>
-        </p:spPr>
-        <p:style>
-          <a:lnRef idx="2">
-            <a:schemeClr val="accent1">
-              <a:shade val="50000"/>
-            </a:schemeClr>
-          </a:lnRef>
-          <a:fillRef idx="1">
-            <a:schemeClr val="accent1"/>
-          </a:fillRef>
-          <a:effectRef idx="0">
-            <a:schemeClr val="accent1"/>
-          </a:effectRef>
-          <a:fontRef idx="minor">
-            <a:schemeClr val="lt1"/>
-          </a:fontRef>
-        </p:style>
-        <p:txBody>
-          <a:bodyPr lIns="502920" tIns="91440"/>
-          <a:lstStyle/>
-          <a:p>
-            <a:pPr eaLnBrk="1" fontAlgn="auto" hangingPunct="1">
-              <a:spcBef>
-                <a:spcPts val="0"/>
-              </a:spcBef>
-              <a:spcAft>
-                <a:spcPts val="0"/>
-              </a:spcAft>
-              <a:defRPr/>
-            </a:pPr>
-            <a:r>
-              <a:rPr lang="en-US" sz="1200" dirty="0">
-                <a:solidFill>
-                  <a:srgbClr val="5B9CD5"/>
-                </a:solidFill>
-                <a:latin typeface="Arial" panose="020B0604020202020204" pitchFamily="34" charset="0"/>
-                <a:cs typeface="Arial" panose="020B0604020202020204" pitchFamily="34" charset="0"/>
-              </a:rPr>
-              <a:t>Region</a:t>
-            </a:r>
-          </a:p>
-        </p:txBody>
-      </p:sp>
       <p:pic>
         <p:nvPicPr>
-          <p:cNvPr id="18" name="Graphic 17">
-            <a:extLst>
-              <a:ext uri="{FF2B5EF4-FFF2-40B4-BE49-F238E27FC236}">
-                <a16:creationId xmlns:a16="http://schemas.microsoft.com/office/drawing/2014/main" id="{2CFAA6A8-0C1F-4661-92D9-DDE965A62643}"/>
+          <p:cNvPr id="19" name="Graphic 18">
+            <a:extLst>
+              <a:ext uri="{FF2B5EF4-FFF2-40B4-BE49-F238E27FC236}">
+                <a16:creationId xmlns:a16="http://schemas.microsoft.com/office/drawing/2014/main" id="{78030678-803C-38E1-8D85-8123CA157855}"/>
               </a:ext>
             </a:extLst>
           </p:cNvPr>
@@ -22422,8 +22240,8 @@
         </p:blipFill>
         <p:spPr>
           <a:xfrm>
-            <a:off x="301625" y="987821"/>
-            <a:ext cx="381000" cy="381000"/>
+            <a:off x="1060220" y="2094594"/>
+            <a:ext cx="295194" cy="295194"/>
           </a:xfrm>
           <a:prstGeom prst="rect">
             <a:avLst/>
@@ -22432,10 +22250,10 @@
       </p:pic>
       <p:pic>
         <p:nvPicPr>
-          <p:cNvPr id="19" name="Graphic 18">
-            <a:extLst>
-              <a:ext uri="{FF2B5EF4-FFF2-40B4-BE49-F238E27FC236}">
-                <a16:creationId xmlns:a16="http://schemas.microsoft.com/office/drawing/2014/main" id="{78030678-803C-38E1-8D85-8123CA157855}"/>
+          <p:cNvPr id="20" name="Graphic 19">
+            <a:extLst>
+              <a:ext uri="{FF2B5EF4-FFF2-40B4-BE49-F238E27FC236}">
+                <a16:creationId xmlns:a16="http://schemas.microsoft.com/office/drawing/2014/main" id="{B95FD5FD-AAC6-B0B2-1217-1BC0F057B5AD}"/>
               </a:ext>
             </a:extLst>
           </p:cNvPr>
@@ -22449,42 +22267,6 @@
             <a:extLst>
               <a:ext uri="{96DAC541-7B7A-43D3-8B79-37D633B846F1}">
                 <asvg:svgBlip xmlns:asvg="http://schemas.microsoft.com/office/drawing/2016/SVG/main" r:embed="rId9"/>
-              </a:ext>
-            </a:extLst>
-          </a:blip>
-          <a:stretch>
-            <a:fillRect/>
-          </a:stretch>
-        </p:blipFill>
-        <p:spPr>
-          <a:xfrm>
-            <a:off x="1060220" y="2094594"/>
-            <a:ext cx="295194" cy="295194"/>
-          </a:xfrm>
-          <a:prstGeom prst="rect">
-            <a:avLst/>
-          </a:prstGeom>
-        </p:spPr>
-      </p:pic>
-      <p:pic>
-        <p:nvPicPr>
-          <p:cNvPr id="20" name="Graphic 19">
-            <a:extLst>
-              <a:ext uri="{FF2B5EF4-FFF2-40B4-BE49-F238E27FC236}">
-                <a16:creationId xmlns:a16="http://schemas.microsoft.com/office/drawing/2014/main" id="{B95FD5FD-AAC6-B0B2-1217-1BC0F057B5AD}"/>
-              </a:ext>
-            </a:extLst>
-          </p:cNvPr>
-          <p:cNvPicPr>
-            <a:picLocks noChangeAspect="1"/>
-          </p:cNvPicPr>
-          <p:nvPr/>
-        </p:nvPicPr>
-        <p:blipFill>
-          <a:blip r:embed="rId10">
-            <a:extLst>
-              <a:ext uri="{96DAC541-7B7A-43D3-8B79-37D633B846F1}">
-                <asvg:svgBlip xmlns:asvg="http://schemas.microsoft.com/office/drawing/2016/SVG/main" r:embed="rId11"/>
               </a:ext>
             </a:extLst>
           </a:blip>
@@ -22932,10 +22714,10 @@
           <p:nvPr/>
         </p:nvPicPr>
         <p:blipFill>
-          <a:blip r:embed="rId8">
+          <a:blip r:embed="rId6">
             <a:extLst>
               <a:ext uri="{96DAC541-7B7A-43D3-8B79-37D633B846F1}">
-                <asvg:svgBlip xmlns:asvg="http://schemas.microsoft.com/office/drawing/2016/SVG/main" r:embed="rId9"/>
+                <asvg:svgBlip xmlns:asvg="http://schemas.microsoft.com/office/drawing/2016/SVG/main" r:embed="rId7"/>
               </a:ext>
             </a:extLst>
           </a:blip>
@@ -22968,10 +22750,10 @@
           <p:nvPr/>
         </p:nvPicPr>
         <p:blipFill>
-          <a:blip r:embed="rId10">
+          <a:blip r:embed="rId8">
             <a:extLst>
               <a:ext uri="{96DAC541-7B7A-43D3-8B79-37D633B846F1}">
-                <asvg:svgBlip xmlns:asvg="http://schemas.microsoft.com/office/drawing/2016/SVG/main" r:embed="rId11"/>
+                <asvg:svgBlip xmlns:asvg="http://schemas.microsoft.com/office/drawing/2016/SVG/main" r:embed="rId9"/>
               </a:ext>
             </a:extLst>
           </a:blip>
@@ -23537,7 +23319,7 @@
           <p:nvPr/>
         </p:nvPicPr>
         <p:blipFill>
-          <a:blip r:embed="rId12">
+          <a:blip r:embed="rId10">
             <a:extLst>
               <a:ext uri="{28A0092B-C50C-407E-A947-70E740481C1C}">
                 <a14:useLocalDpi xmlns:a14="http://schemas.microsoft.com/office/drawing/2010/main" val="0"/>
@@ -23783,7 +23565,7 @@
           <p:nvPr/>
         </p:nvPicPr>
         <p:blipFill>
-          <a:blip r:embed="rId12">
+          <a:blip r:embed="rId10">
             <a:extLst>
               <a:ext uri="{28A0092B-C50C-407E-A947-70E740481C1C}">
                 <a14:useLocalDpi xmlns:a14="http://schemas.microsoft.com/office/drawing/2010/main" val="0"/>
@@ -24356,7 +24138,7 @@
           <p:nvPr/>
         </p:nvPicPr>
         <p:blipFill>
-          <a:blip r:embed="rId13">
+          <a:blip r:embed="rId11">
             <a:extLst>
               <a:ext uri="{28A0092B-C50C-407E-A947-70E740481C1C}">
                 <a14:useLocalDpi xmlns:a14="http://schemas.microsoft.com/office/drawing/2010/main" val="0"/>
@@ -24416,10 +24198,10 @@
           <p:nvPr/>
         </p:nvPicPr>
         <p:blipFill>
-          <a:blip r:embed="rId14">
+          <a:blip r:embed="rId12">
             <a:extLst>
               <a:ext uri="{96DAC541-7B7A-43D3-8B79-37D633B846F1}">
-                <asvg:svgBlip xmlns:asvg="http://schemas.microsoft.com/office/drawing/2016/SVG/main" r:embed="rId15"/>
+                <asvg:svgBlip xmlns:asvg="http://schemas.microsoft.com/office/drawing/2016/SVG/main" r:embed="rId13"/>
               </a:ext>
             </a:extLst>
           </a:blip>
@@ -24452,10 +24234,10 @@
           <p:nvPr/>
         </p:nvPicPr>
         <p:blipFill>
-          <a:blip r:embed="rId14">
+          <a:blip r:embed="rId12">
             <a:extLst>
               <a:ext uri="{96DAC541-7B7A-43D3-8B79-37D633B846F1}">
-                <asvg:svgBlip xmlns:asvg="http://schemas.microsoft.com/office/drawing/2016/SVG/main" r:embed="rId15"/>
+                <asvg:svgBlip xmlns:asvg="http://schemas.microsoft.com/office/drawing/2016/SVG/main" r:embed="rId13"/>
               </a:ext>
             </a:extLst>
           </a:blip>
@@ -24488,7 +24270,7 @@
           <p:nvPr/>
         </p:nvPicPr>
         <p:blipFill>
-          <a:blip r:embed="rId13">
+          <a:blip r:embed="rId11">
             <a:extLst>
               <a:ext uri="{28A0092B-C50C-407E-A947-70E740481C1C}">
                 <a14:useLocalDpi xmlns:a14="http://schemas.microsoft.com/office/drawing/2010/main" val="0"/>
@@ -24548,7 +24330,7 @@
           <p:nvPr/>
         </p:nvPicPr>
         <p:blipFill>
-          <a:blip r:embed="rId12">
+          <a:blip r:embed="rId10">
             <a:extLst>
               <a:ext uri="{28A0092B-C50C-407E-A947-70E740481C1C}">
                 <a14:useLocalDpi xmlns:a14="http://schemas.microsoft.com/office/drawing/2010/main" val="0"/>
@@ -24608,7 +24390,7 @@
           <p:nvPr/>
         </p:nvPicPr>
         <p:blipFill>
-          <a:blip r:embed="rId12">
+          <a:blip r:embed="rId10">
             <a:extLst>
               <a:ext uri="{28A0092B-C50C-407E-A947-70E740481C1C}">
                 <a14:useLocalDpi xmlns:a14="http://schemas.microsoft.com/office/drawing/2010/main" val="0"/>
@@ -24668,7 +24450,7 @@
           <p:nvPr/>
         </p:nvPicPr>
         <p:blipFill>
-          <a:blip r:embed="rId12">
+          <a:blip r:embed="rId10">
             <a:extLst>
               <a:ext uri="{28A0092B-C50C-407E-A947-70E740481C1C}">
                 <a14:useLocalDpi xmlns:a14="http://schemas.microsoft.com/office/drawing/2010/main" val="0"/>
@@ -24728,7 +24510,7 @@
           <p:nvPr/>
         </p:nvPicPr>
         <p:blipFill>
-          <a:blip r:embed="rId16">
+          <a:blip r:embed="rId14">
             <a:extLst>
               <a:ext uri="{28A0092B-C50C-407E-A947-70E740481C1C}">
                 <a14:useLocalDpi xmlns:a14="http://schemas.microsoft.com/office/drawing/2010/main" val="0"/>
@@ -24788,7 +24570,7 @@
           <p:nvPr/>
         </p:nvPicPr>
         <p:blipFill>
-          <a:blip r:embed="rId17">
+          <a:blip r:embed="rId15">
             <a:extLst>
               <a:ext uri="{28A0092B-C50C-407E-A947-70E740481C1C}">
                 <a14:useLocalDpi xmlns:a14="http://schemas.microsoft.com/office/drawing/2010/main" val="0"/>
@@ -24848,7 +24630,7 @@
           <p:nvPr/>
         </p:nvPicPr>
         <p:blipFill>
-          <a:blip r:embed="rId18">
+          <a:blip r:embed="rId16">
             <a:extLst>
               <a:ext uri="{28A0092B-C50C-407E-A947-70E740481C1C}">
                 <a14:useLocalDpi xmlns:a14="http://schemas.microsoft.com/office/drawing/2010/main" val="0"/>
@@ -25069,7 +24851,7 @@
           <p:nvPr/>
         </p:nvPicPr>
         <p:blipFill>
-          <a:blip r:embed="rId19">
+          <a:blip r:embed="rId17">
             <a:extLst>
               <a:ext uri="{28A0092B-C50C-407E-A947-70E740481C1C}">
                 <a14:useLocalDpi xmlns:a14="http://schemas.microsoft.com/office/drawing/2010/main" val="0"/>
@@ -25290,7 +25072,7 @@
           <p:nvPr/>
         </p:nvPicPr>
         <p:blipFill>
-          <a:blip r:embed="rId19">
+          <a:blip r:embed="rId17">
             <a:extLst>
               <a:ext uri="{28A0092B-C50C-407E-A947-70E740481C1C}">
                 <a14:useLocalDpi xmlns:a14="http://schemas.microsoft.com/office/drawing/2010/main" val="0"/>
@@ -25511,7 +25293,7 @@
           <p:nvPr/>
         </p:nvPicPr>
         <p:blipFill>
-          <a:blip r:embed="rId20">
+          <a:blip r:embed="rId18">
             <a:extLst>
               <a:ext uri="{28A0092B-C50C-407E-A947-70E740481C1C}">
                 <a14:useLocalDpi xmlns:a14="http://schemas.microsoft.com/office/drawing/2010/main" val="0"/>
@@ -25525,7 +25307,7 @@
         </p:blipFill>
         <p:spPr bwMode="auto">
           <a:xfrm>
-            <a:off x="10724200" y="1031176"/>
+            <a:off x="10760776" y="939736"/>
             <a:ext cx="762000" cy="762000"/>
           </a:xfrm>
           <a:prstGeom prst="rect">
@@ -25572,7 +25354,7 @@
         </p:nvSpPr>
         <p:spPr bwMode="auto">
           <a:xfrm>
-            <a:off x="9984425" y="1794763"/>
+            <a:off x="10021001" y="1703323"/>
             <a:ext cx="2243137" cy="461665"/>
           </a:xfrm>
           <a:prstGeom prst="rect">
@@ -25732,7 +25514,7 @@
           <p:nvPr/>
         </p:nvPicPr>
         <p:blipFill>
-          <a:blip r:embed="rId21">
+          <a:blip r:embed="rId19">
             <a:extLst>
               <a:ext uri="{28A0092B-C50C-407E-A947-70E740481C1C}">
                 <a14:useLocalDpi xmlns:a14="http://schemas.microsoft.com/office/drawing/2010/main" val="0"/>
@@ -25746,7 +25528,7 @@
         </p:blipFill>
         <p:spPr bwMode="auto">
           <a:xfrm>
-            <a:off x="10713390" y="2214225"/>
+            <a:off x="10749966" y="2122785"/>
             <a:ext cx="762000" cy="762000"/>
           </a:xfrm>
           <a:prstGeom prst="rect">
@@ -25793,7 +25575,7 @@
         </p:nvSpPr>
         <p:spPr bwMode="auto">
           <a:xfrm>
-            <a:off x="9956153" y="2976225"/>
+            <a:off x="9992729" y="2884785"/>
             <a:ext cx="2292350" cy="276999"/>
           </a:xfrm>
           <a:prstGeom prst="rect">
@@ -25953,7 +25735,7 @@
           <p:nvPr/>
         </p:nvPicPr>
         <p:blipFill>
-          <a:blip r:embed="rId22">
+          <a:blip r:embed="rId20">
             <a:extLst>
               <a:ext uri="{28A0092B-C50C-407E-A947-70E740481C1C}">
                 <a14:useLocalDpi xmlns:a14="http://schemas.microsoft.com/office/drawing/2010/main" val="0"/>
@@ -25967,7 +25749,7 @@
         </p:blipFill>
         <p:spPr bwMode="auto">
           <a:xfrm>
-            <a:off x="10724657" y="3222215"/>
+            <a:off x="10761233" y="3130775"/>
             <a:ext cx="762000" cy="762000"/>
           </a:xfrm>
           <a:prstGeom prst="rect">
@@ -26014,7 +25796,7 @@
         </p:nvSpPr>
         <p:spPr bwMode="auto">
           <a:xfrm>
-            <a:off x="9965832" y="3984215"/>
+            <a:off x="10002408" y="3892775"/>
             <a:ext cx="2292350" cy="276999"/>
           </a:xfrm>
           <a:prstGeom prst="rect">
@@ -26174,7 +25956,7 @@
           <p:nvPr/>
         </p:nvPicPr>
         <p:blipFill>
-          <a:blip r:embed="rId23">
+          <a:blip r:embed="rId21">
             <a:extLst>
               <a:ext uri="{28A0092B-C50C-407E-A947-70E740481C1C}">
                 <a14:useLocalDpi xmlns:a14="http://schemas.microsoft.com/office/drawing/2010/main" val="0"/>
@@ -26188,7 +25970,7 @@
         </p:blipFill>
         <p:spPr bwMode="auto">
           <a:xfrm>
-            <a:off x="10716342" y="4276485"/>
+            <a:off x="10752918" y="4185045"/>
             <a:ext cx="762000" cy="762000"/>
           </a:xfrm>
           <a:prstGeom prst="rect">
@@ -26235,7 +26017,7 @@
         </p:nvSpPr>
         <p:spPr bwMode="auto">
           <a:xfrm>
-            <a:off x="9959105" y="5048010"/>
+            <a:off x="9995681" y="4956570"/>
             <a:ext cx="2292350" cy="276999"/>
           </a:xfrm>
           <a:prstGeom prst="rect">
@@ -26395,7 +26177,7 @@
           <p:nvPr/>
         </p:nvPicPr>
         <p:blipFill>
-          <a:blip r:embed="rId24">
+          <a:blip r:embed="rId22">
             <a:extLst>
               <a:ext uri="{28A0092B-C50C-407E-A947-70E740481C1C}">
                 <a14:useLocalDpi xmlns:a14="http://schemas.microsoft.com/office/drawing/2010/main" val="0"/>
@@ -26409,7 +26191,7 @@
         </p:blipFill>
         <p:spPr bwMode="auto">
           <a:xfrm>
-            <a:off x="10703407" y="5400645"/>
+            <a:off x="10739983" y="5309205"/>
             <a:ext cx="762000" cy="762000"/>
           </a:xfrm>
           <a:prstGeom prst="rect">
@@ -26456,7 +26238,7 @@
         </p:nvSpPr>
         <p:spPr bwMode="auto">
           <a:xfrm>
-            <a:off x="9944582" y="6161851"/>
+            <a:off x="9981158" y="6070411"/>
             <a:ext cx="2292350" cy="276999"/>
           </a:xfrm>
           <a:prstGeom prst="rect">
@@ -26792,7 +26574,7 @@
           <p:nvPr/>
         </p:nvPicPr>
         <p:blipFill>
-          <a:blip r:embed="rId25">
+          <a:blip r:embed="rId23">
             <a:extLst>
               <a:ext uri="{28A0092B-C50C-407E-A947-70E740481C1C}">
                 <a14:useLocalDpi xmlns:a14="http://schemas.microsoft.com/office/drawing/2010/main" val="0"/>
@@ -27028,7 +26810,7 @@
           <p:nvPr/>
         </p:nvPicPr>
         <p:blipFill>
-          <a:blip r:embed="rId25">
+          <a:blip r:embed="rId23">
             <a:extLst>
               <a:ext uri="{28A0092B-C50C-407E-A947-70E740481C1C}">
                 <a14:useLocalDpi xmlns:a14="http://schemas.microsoft.com/office/drawing/2010/main" val="0"/>
@@ -27427,23 +27209,20 @@
               <a:tabLst/>
               <a:defRPr/>
             </a:pPr>
-            <a:r>
-              <a:rPr kumimoji="0" lang="en-US" sz="1200" b="0" i="0" u="none" strike="noStrike" kern="1200" cap="none" spc="0" normalizeH="0" baseline="0" noProof="0" dirty="0">
-                <a:ln>
-                  <a:noFill/>
-                </a:ln>
-                <a:solidFill>
-                  <a:sysClr val="windowText" lastClr="000000"/>
-                </a:solidFill>
-                <a:effectLst/>
-                <a:uLnTx/>
-                <a:uFillTx/>
-                <a:latin typeface="Arial" panose="020B0604020202020204" pitchFamily="34" charset="0"/>
-                <a:ea typeface="+mn-ea"/>
-                <a:cs typeface="Arial" panose="020B0604020202020204" pitchFamily="34" charset="0"/>
-              </a:rPr>
-              <a:t>AWS Cloud</a:t>
-            </a:r>
+            <a:endParaRPr kumimoji="0" lang="en-US" sz="1200" b="0" i="0" u="none" strike="noStrike" kern="1200" cap="none" spc="0" normalizeH="0" baseline="0" noProof="0" dirty="0">
+              <a:ln>
+                <a:noFill/>
+              </a:ln>
+              <a:solidFill>
+                <a:sysClr val="windowText" lastClr="000000"/>
+              </a:solidFill>
+              <a:effectLst/>
+              <a:uLnTx/>
+              <a:uFillTx/>
+              <a:latin typeface="Arial" panose="020B0604020202020204" pitchFamily="34" charset="0"/>
+              <a:ea typeface="+mn-ea"/>
+              <a:cs typeface="Arial" panose="020B0604020202020204" pitchFamily="34" charset="0"/>
+            </a:endParaRPr>
           </a:p>
         </p:txBody>
       </p:sp>
@@ -28126,82 +27905,12 @@
           </a:p>
         </p:txBody>
       </p:sp>
-      <p:sp>
-        <p:nvSpPr>
-          <p:cNvPr id="44" name="Rectangle 43">
-            <a:extLst>
-              <a:ext uri="{FF2B5EF4-FFF2-40B4-BE49-F238E27FC236}">
-                <a16:creationId xmlns:a16="http://schemas.microsoft.com/office/drawing/2014/main" id="{4537C86D-7502-434C-AB1C-77DB11C905B6}"/>
-              </a:ext>
-            </a:extLst>
-          </p:cNvPr>
-          <p:cNvSpPr/>
-          <p:nvPr/>
-        </p:nvSpPr>
-        <p:spPr>
-          <a:xfrm>
-            <a:off x="301625" y="976854"/>
-            <a:ext cx="11712575" cy="5614446"/>
-          </a:xfrm>
-          <a:prstGeom prst="rect">
-            <a:avLst/>
-          </a:prstGeom>
-          <a:noFill/>
-          <a:ln w="12700">
-            <a:solidFill>
-              <a:srgbClr val="5B9CD5"/>
-            </a:solidFill>
-            <a:prstDash val="sysDash"/>
-          </a:ln>
-        </p:spPr>
-        <p:style>
-          <a:lnRef idx="2">
-            <a:schemeClr val="accent1">
-              <a:shade val="50000"/>
-            </a:schemeClr>
-          </a:lnRef>
-          <a:fillRef idx="1">
-            <a:schemeClr val="accent1"/>
-          </a:fillRef>
-          <a:effectRef idx="0">
-            <a:schemeClr val="accent1"/>
-          </a:effectRef>
-          <a:fontRef idx="minor">
-            <a:schemeClr val="lt1"/>
-          </a:fontRef>
-        </p:style>
-        <p:txBody>
-          <a:bodyPr lIns="502920" tIns="91440"/>
-          <a:lstStyle/>
-          <a:p>
-            <a:pPr eaLnBrk="1" fontAlgn="auto" hangingPunct="1">
-              <a:spcBef>
-                <a:spcPts val="0"/>
-              </a:spcBef>
-              <a:spcAft>
-                <a:spcPts val="0"/>
-              </a:spcAft>
-              <a:defRPr/>
-            </a:pPr>
-            <a:r>
-              <a:rPr lang="en-US" sz="1200" dirty="0">
-                <a:solidFill>
-                  <a:srgbClr val="5B9CD5"/>
-                </a:solidFill>
-                <a:latin typeface="Arial" panose="020B0604020202020204" pitchFamily="34" charset="0"/>
-                <a:cs typeface="Arial" panose="020B0604020202020204" pitchFamily="34" charset="0"/>
-              </a:rPr>
-              <a:t>Region</a:t>
-            </a:r>
-          </a:p>
-        </p:txBody>
-      </p:sp>
       <p:pic>
         <p:nvPicPr>
-          <p:cNvPr id="46" name="Graphic 45">
-            <a:extLst>
-              <a:ext uri="{FF2B5EF4-FFF2-40B4-BE49-F238E27FC236}">
-                <a16:creationId xmlns:a16="http://schemas.microsoft.com/office/drawing/2014/main" id="{3BD774D2-D444-9F41-8C2D-95BD2DA8A293}"/>
+          <p:cNvPr id="49" name="Graphic 48">
+            <a:extLst>
+              <a:ext uri="{FF2B5EF4-FFF2-40B4-BE49-F238E27FC236}">
+                <a16:creationId xmlns:a16="http://schemas.microsoft.com/office/drawing/2014/main" id="{F88FDB8F-EE69-CA4C-BA7D-77D1617E7A7A}"/>
               </a:ext>
             </a:extLst>
           </p:cNvPr>
@@ -28224,8 +27933,8 @@
         </p:blipFill>
         <p:spPr>
           <a:xfrm>
-            <a:off x="301625" y="987821"/>
-            <a:ext cx="381000" cy="381000"/>
+            <a:off x="1060220" y="2094594"/>
+            <a:ext cx="295194" cy="295194"/>
           </a:xfrm>
           <a:prstGeom prst="rect">
             <a:avLst/>
@@ -28234,10 +27943,10 @@
       </p:pic>
       <p:pic>
         <p:nvPicPr>
-          <p:cNvPr id="49" name="Graphic 48">
-            <a:extLst>
-              <a:ext uri="{FF2B5EF4-FFF2-40B4-BE49-F238E27FC236}">
-                <a16:creationId xmlns:a16="http://schemas.microsoft.com/office/drawing/2014/main" id="{F88FDB8F-EE69-CA4C-BA7D-77D1617E7A7A}"/>
+          <p:cNvPr id="50" name="Graphic 49">
+            <a:extLst>
+              <a:ext uri="{FF2B5EF4-FFF2-40B4-BE49-F238E27FC236}">
+                <a16:creationId xmlns:a16="http://schemas.microsoft.com/office/drawing/2014/main" id="{99CEE759-5B3C-F34D-A7E1-8309D1A608E9}"/>
               </a:ext>
             </a:extLst>
           </p:cNvPr>
@@ -28251,42 +27960,6 @@
             <a:extLst>
               <a:ext uri="{96DAC541-7B7A-43D3-8B79-37D633B846F1}">
                 <asvg:svgBlip xmlns:asvg="http://schemas.microsoft.com/office/drawing/2016/SVG/main" r:embed="rId9"/>
-              </a:ext>
-            </a:extLst>
-          </a:blip>
-          <a:stretch>
-            <a:fillRect/>
-          </a:stretch>
-        </p:blipFill>
-        <p:spPr>
-          <a:xfrm>
-            <a:off x="1060220" y="2094594"/>
-            <a:ext cx="295194" cy="295194"/>
-          </a:xfrm>
-          <a:prstGeom prst="rect">
-            <a:avLst/>
-          </a:prstGeom>
-        </p:spPr>
-      </p:pic>
-      <p:pic>
-        <p:nvPicPr>
-          <p:cNvPr id="50" name="Graphic 49">
-            <a:extLst>
-              <a:ext uri="{FF2B5EF4-FFF2-40B4-BE49-F238E27FC236}">
-                <a16:creationId xmlns:a16="http://schemas.microsoft.com/office/drawing/2014/main" id="{99CEE759-5B3C-F34D-A7E1-8309D1A608E9}"/>
-              </a:ext>
-            </a:extLst>
-          </p:cNvPr>
-          <p:cNvPicPr>
-            <a:picLocks noChangeAspect="1"/>
-          </p:cNvPicPr>
-          <p:nvPr/>
-        </p:nvPicPr>
-        <p:blipFill>
-          <a:blip r:embed="rId10">
-            <a:extLst>
-              <a:ext uri="{96DAC541-7B7A-43D3-8B79-37D633B846F1}">
-                <asvg:svgBlip xmlns:asvg="http://schemas.microsoft.com/office/drawing/2016/SVG/main" r:embed="rId11"/>
               </a:ext>
             </a:extLst>
           </a:blip>
@@ -28734,10 +28407,10 @@
           <p:nvPr/>
         </p:nvPicPr>
         <p:blipFill>
-          <a:blip r:embed="rId8">
+          <a:blip r:embed="rId6">
             <a:extLst>
               <a:ext uri="{96DAC541-7B7A-43D3-8B79-37D633B846F1}">
-                <asvg:svgBlip xmlns:asvg="http://schemas.microsoft.com/office/drawing/2016/SVG/main" r:embed="rId9"/>
+                <asvg:svgBlip xmlns:asvg="http://schemas.microsoft.com/office/drawing/2016/SVG/main" r:embed="rId7"/>
               </a:ext>
             </a:extLst>
           </a:blip>
@@ -28770,10 +28443,10 @@
           <p:nvPr/>
         </p:nvPicPr>
         <p:blipFill>
-          <a:blip r:embed="rId10">
+          <a:blip r:embed="rId8">
             <a:extLst>
               <a:ext uri="{96DAC541-7B7A-43D3-8B79-37D633B846F1}">
-                <asvg:svgBlip xmlns:asvg="http://schemas.microsoft.com/office/drawing/2016/SVG/main" r:embed="rId11"/>
+                <asvg:svgBlip xmlns:asvg="http://schemas.microsoft.com/office/drawing/2016/SVG/main" r:embed="rId9"/>
               </a:ext>
             </a:extLst>
           </a:blip>
@@ -29153,7 +28826,7 @@
           <p:nvPr/>
         </p:nvPicPr>
         <p:blipFill>
-          <a:blip r:embed="rId12">
+          <a:blip r:embed="rId10">
             <a:extLst>
               <a:ext uri="{28A0092B-C50C-407E-A947-70E740481C1C}">
                 <a14:useLocalDpi xmlns:a14="http://schemas.microsoft.com/office/drawing/2010/main" val="0"/>
@@ -29399,7 +29072,7 @@
           <p:nvPr/>
         </p:nvPicPr>
         <p:blipFill>
-          <a:blip r:embed="rId12">
+          <a:blip r:embed="rId10">
             <a:extLst>
               <a:ext uri="{28A0092B-C50C-407E-A947-70E740481C1C}">
                 <a14:useLocalDpi xmlns:a14="http://schemas.microsoft.com/office/drawing/2010/main" val="0"/>
@@ -30062,7 +29735,7 @@
           <p:nvPr/>
         </p:nvPicPr>
         <p:blipFill>
-          <a:blip r:embed="rId13">
+          <a:blip r:embed="rId11">
             <a:extLst>
               <a:ext uri="{28A0092B-C50C-407E-A947-70E740481C1C}">
                 <a14:useLocalDpi xmlns:a14="http://schemas.microsoft.com/office/drawing/2010/main" val="0"/>
@@ -30122,10 +29795,10 @@
           <p:nvPr/>
         </p:nvPicPr>
         <p:blipFill>
-          <a:blip r:embed="rId14">
+          <a:blip r:embed="rId12">
             <a:extLst>
               <a:ext uri="{96DAC541-7B7A-43D3-8B79-37D633B846F1}">
-                <asvg:svgBlip xmlns:asvg="http://schemas.microsoft.com/office/drawing/2016/SVG/main" r:embed="rId15"/>
+                <asvg:svgBlip xmlns:asvg="http://schemas.microsoft.com/office/drawing/2016/SVG/main" r:embed="rId13"/>
               </a:ext>
             </a:extLst>
           </a:blip>
@@ -30158,10 +29831,10 @@
           <p:nvPr/>
         </p:nvPicPr>
         <p:blipFill>
-          <a:blip r:embed="rId14">
+          <a:blip r:embed="rId12">
             <a:extLst>
               <a:ext uri="{96DAC541-7B7A-43D3-8B79-37D633B846F1}">
-                <asvg:svgBlip xmlns:asvg="http://schemas.microsoft.com/office/drawing/2016/SVG/main" r:embed="rId15"/>
+                <asvg:svgBlip xmlns:asvg="http://schemas.microsoft.com/office/drawing/2016/SVG/main" r:embed="rId13"/>
               </a:ext>
             </a:extLst>
           </a:blip>
@@ -30194,7 +29867,7 @@
           <p:nvPr/>
         </p:nvPicPr>
         <p:blipFill>
-          <a:blip r:embed="rId13">
+          <a:blip r:embed="rId11">
             <a:extLst>
               <a:ext uri="{28A0092B-C50C-407E-A947-70E740481C1C}">
                 <a14:useLocalDpi xmlns:a14="http://schemas.microsoft.com/office/drawing/2010/main" val="0"/>
@@ -30254,7 +29927,7 @@
           <p:nvPr/>
         </p:nvPicPr>
         <p:blipFill>
-          <a:blip r:embed="rId12">
+          <a:blip r:embed="rId10">
             <a:extLst>
               <a:ext uri="{28A0092B-C50C-407E-A947-70E740481C1C}">
                 <a14:useLocalDpi xmlns:a14="http://schemas.microsoft.com/office/drawing/2010/main" val="0"/>
@@ -30314,7 +29987,7 @@
           <p:nvPr/>
         </p:nvPicPr>
         <p:blipFill>
-          <a:blip r:embed="rId12">
+          <a:blip r:embed="rId10">
             <a:extLst>
               <a:ext uri="{28A0092B-C50C-407E-A947-70E740481C1C}">
                 <a14:useLocalDpi xmlns:a14="http://schemas.microsoft.com/office/drawing/2010/main" val="0"/>
@@ -30374,7 +30047,7 @@
           <p:nvPr/>
         </p:nvPicPr>
         <p:blipFill>
-          <a:blip r:embed="rId16">
+          <a:blip r:embed="rId14">
             <a:extLst>
               <a:ext uri="{28A0092B-C50C-407E-A947-70E740481C1C}">
                 <a14:useLocalDpi xmlns:a14="http://schemas.microsoft.com/office/drawing/2010/main" val="0"/>
@@ -30434,7 +30107,7 @@
           <p:nvPr/>
         </p:nvPicPr>
         <p:blipFill>
-          <a:blip r:embed="rId17">
+          <a:blip r:embed="rId15">
             <a:extLst>
               <a:ext uri="{28A0092B-C50C-407E-A947-70E740481C1C}">
                 <a14:useLocalDpi xmlns:a14="http://schemas.microsoft.com/office/drawing/2010/main" val="0"/>
@@ -30494,7 +30167,7 @@
           <p:nvPr/>
         </p:nvPicPr>
         <p:blipFill>
-          <a:blip r:embed="rId18">
+          <a:blip r:embed="rId16">
             <a:extLst>
               <a:ext uri="{28A0092B-C50C-407E-A947-70E740481C1C}">
                 <a14:useLocalDpi xmlns:a14="http://schemas.microsoft.com/office/drawing/2010/main" val="0"/>
@@ -30715,7 +30388,7 @@
           <p:nvPr/>
         </p:nvPicPr>
         <p:blipFill>
-          <a:blip r:embed="rId19">
+          <a:blip r:embed="rId17">
             <a:extLst>
               <a:ext uri="{28A0092B-C50C-407E-A947-70E740481C1C}">
                 <a14:useLocalDpi xmlns:a14="http://schemas.microsoft.com/office/drawing/2010/main" val="0"/>
@@ -30936,7 +30609,7 @@
           <p:nvPr/>
         </p:nvPicPr>
         <p:blipFill>
-          <a:blip r:embed="rId19">
+          <a:blip r:embed="rId17">
             <a:extLst>
               <a:ext uri="{28A0092B-C50C-407E-A947-70E740481C1C}">
                 <a14:useLocalDpi xmlns:a14="http://schemas.microsoft.com/office/drawing/2010/main" val="0"/>
@@ -31157,7 +30830,7 @@
           <p:nvPr/>
         </p:nvPicPr>
         <p:blipFill>
-          <a:blip r:embed="rId20">
+          <a:blip r:embed="rId18">
             <a:extLst>
               <a:ext uri="{28A0092B-C50C-407E-A947-70E740481C1C}">
                 <a14:useLocalDpi xmlns:a14="http://schemas.microsoft.com/office/drawing/2010/main" val="0"/>
@@ -31378,7 +31051,7 @@
           <p:nvPr/>
         </p:nvPicPr>
         <p:blipFill>
-          <a:blip r:embed="rId21">
+          <a:blip r:embed="rId19">
             <a:extLst>
               <a:ext uri="{28A0092B-C50C-407E-A947-70E740481C1C}">
                 <a14:useLocalDpi xmlns:a14="http://schemas.microsoft.com/office/drawing/2010/main" val="0"/>
@@ -31599,7 +31272,7 @@
           <p:nvPr/>
         </p:nvPicPr>
         <p:blipFill>
-          <a:blip r:embed="rId22">
+          <a:blip r:embed="rId20">
             <a:extLst>
               <a:ext uri="{28A0092B-C50C-407E-A947-70E740481C1C}">
                 <a14:useLocalDpi xmlns:a14="http://schemas.microsoft.com/office/drawing/2010/main" val="0"/>
@@ -31820,7 +31493,7 @@
           <p:nvPr/>
         </p:nvPicPr>
         <p:blipFill>
-          <a:blip r:embed="rId23">
+          <a:blip r:embed="rId21">
             <a:extLst>
               <a:ext uri="{28A0092B-C50C-407E-A947-70E740481C1C}">
                 <a14:useLocalDpi xmlns:a14="http://schemas.microsoft.com/office/drawing/2010/main" val="0"/>
@@ -32041,7 +31714,7 @@
           <p:nvPr/>
         </p:nvPicPr>
         <p:blipFill>
-          <a:blip r:embed="rId24">
+          <a:blip r:embed="rId22">
             <a:extLst>
               <a:ext uri="{28A0092B-C50C-407E-A947-70E740481C1C}">
                 <a14:useLocalDpi xmlns:a14="http://schemas.microsoft.com/office/drawing/2010/main" val="0"/>
@@ -32262,7 +31935,7 @@
           <p:nvPr/>
         </p:nvPicPr>
         <p:blipFill>
-          <a:blip r:embed="rId25">
+          <a:blip r:embed="rId23">
             <a:extLst>
               <a:ext uri="{28A0092B-C50C-407E-A947-70E740481C1C}">
                 <a14:useLocalDpi xmlns:a14="http://schemas.microsoft.com/office/drawing/2010/main" val="0"/>

</xml_diff>

<commit_message>
TW edits for diagram, spelling, format
</commit_message>
<xml_diff>
--- a/docs/deployment_guide/images/Quick Start Ref. Arch.pptx
+++ b/docs/deployment_guide/images/Quick Start Ref. Arch.pptx
@@ -15368,40 +15368,6 @@
       </p:sp>
       <p:sp>
         <p:nvSpPr>
-          <p:cNvPr id="47105" name="Title 1">
-            <a:extLst>
-              <a:ext uri="{FF2B5EF4-FFF2-40B4-BE49-F238E27FC236}">
-                <a16:creationId xmlns:a16="http://schemas.microsoft.com/office/drawing/2014/main" id="{6EA39E97-4C97-AD40-972C-394E863845C9}"/>
-              </a:ext>
-            </a:extLst>
-          </p:cNvPr>
-          <p:cNvSpPr>
-            <a:spLocks noGrp="1" noChangeArrowheads="1"/>
-          </p:cNvSpPr>
-          <p:nvPr>
-            <p:ph type="title"/>
-          </p:nvPr>
-        </p:nvSpPr>
-        <p:spPr>
-          <a:xfrm>
-            <a:off x="241300" y="-98029"/>
-            <a:ext cx="11709400" cy="644525"/>
-          </a:xfrm>
-        </p:spPr>
-        <p:txBody>
-          <a:bodyPr/>
-          <a:lstStyle/>
-          <a:p>
-            <a:pPr algn="ctr" eaLnBrk="1" hangingPunct="1"/>
-            <a:r>
-              <a:rPr lang="en-US" altLang="en-US" sz="2400" dirty="0"/>
-              <a:t>Amazon WorkSpaces Quick Start – Self-Managed AD</a:t>
-            </a:r>
-          </a:p>
-        </p:txBody>
-      </p:sp>
-      <p:sp>
-        <p:nvSpPr>
           <p:cNvPr id="4" name="Rectangle 3">
             <a:extLst>
               <a:ext uri="{FF2B5EF4-FFF2-40B4-BE49-F238E27FC236}">
@@ -15664,8 +15630,8 @@
         </p:nvSpPr>
         <p:spPr bwMode="auto">
           <a:xfrm>
-            <a:off x="1112838" y="2553017"/>
-            <a:ext cx="1767152" cy="246221"/>
+            <a:off x="527262" y="2554253"/>
+            <a:ext cx="1767152" cy="276999"/>
           </a:xfrm>
           <a:prstGeom prst="rect">
             <a:avLst/>
@@ -15815,7 +15781,7 @@
               <a:defRPr/>
             </a:pPr>
             <a:r>
-              <a:rPr kumimoji="0" lang="en-US" altLang="en-US" sz="1000" b="0" i="0" u="none" strike="noStrike" kern="1200" cap="none" spc="0" normalizeH="0" baseline="0" noProof="0" dirty="0">
+              <a:rPr kumimoji="0" lang="en-US" altLang="en-US" sz="1200" b="0" i="0" u="none" strike="noStrike" kern="1200" cap="none" spc="0" normalizeH="0" baseline="0" noProof="0" dirty="0">
                 <a:ln>
                   <a:noFill/>
                 </a:ln>
@@ -15850,8 +15816,8 @@
         </p:nvSpPr>
         <p:spPr bwMode="auto">
           <a:xfrm>
-            <a:off x="2420810" y="4175878"/>
-            <a:ext cx="1307913" cy="246221"/>
+            <a:off x="2382710" y="4175878"/>
+            <a:ext cx="1307913" cy="276999"/>
           </a:xfrm>
           <a:prstGeom prst="rect">
             <a:avLst/>
@@ -16001,7 +15967,7 @@
               <a:defRPr/>
             </a:pPr>
             <a:r>
-              <a:rPr kumimoji="0" lang="en-US" altLang="en-US" sz="1000" b="0" i="0" u="none" strike="noStrike" kern="1200" cap="none" spc="0" normalizeH="0" baseline="0" noProof="0" dirty="0">
+              <a:rPr kumimoji="0" lang="en-US" altLang="en-US" sz="1200" b="0" i="0" u="none" strike="noStrike" kern="1200" cap="none" spc="0" normalizeH="0" baseline="0" noProof="0" dirty="0">
                 <a:ln>
                   <a:noFill/>
                 </a:ln>
@@ -16047,7 +16013,7 @@
         </p:blipFill>
         <p:spPr>
           <a:xfrm>
-            <a:off x="122428" y="400192"/>
+            <a:off x="113697" y="383524"/>
             <a:ext cx="381000" cy="381000"/>
           </a:xfrm>
           <a:prstGeom prst="rect">
@@ -16083,7 +16049,7 @@
         </p:blipFill>
         <p:spPr>
           <a:xfrm>
-            <a:off x="238298" y="1368568"/>
+            <a:off x="240679" y="1366187"/>
             <a:ext cx="381000" cy="381000"/>
           </a:xfrm>
           <a:prstGeom prst="rect">
@@ -16223,7 +16189,7 @@
               <a:defRPr/>
             </a:pPr>
             <a:r>
-              <a:rPr kumimoji="0" lang="en-US" sz="1000" b="0" i="0" u="none" strike="noStrike" kern="1200" cap="none" spc="0" normalizeH="0" baseline="0" noProof="0" dirty="0">
+              <a:rPr kumimoji="0" lang="en-US" sz="1200" b="0" i="0" u="none" strike="noStrike" kern="1200" cap="none" spc="0" normalizeH="0" baseline="0" noProof="0" dirty="0">
                 <a:ln>
                   <a:noFill/>
                 </a:ln>
@@ -16270,7 +16236,7 @@
         </p:blipFill>
         <p:spPr>
           <a:xfrm>
-            <a:off x="785900" y="1737978"/>
+            <a:off x="785900" y="1726073"/>
             <a:ext cx="295194" cy="295194"/>
           </a:xfrm>
           <a:prstGeom prst="rect">
@@ -16306,7 +16272,7 @@
         </p:blipFill>
         <p:spPr>
           <a:xfrm>
-            <a:off x="775105" y="3132965"/>
+            <a:off x="784629" y="3130584"/>
             <a:ext cx="381000" cy="381000"/>
           </a:xfrm>
           <a:prstGeom prst="rect">
@@ -16328,7 +16294,7 @@
         </p:nvSpPr>
         <p:spPr>
           <a:xfrm>
-            <a:off x="6931355" y="3092631"/>
+            <a:off x="6931355" y="3130731"/>
             <a:ext cx="2760031" cy="2712603"/>
           </a:xfrm>
           <a:prstGeom prst="rect">
@@ -16472,7 +16438,7 @@
         </p:nvSpPr>
         <p:spPr bwMode="auto">
           <a:xfrm>
-            <a:off x="6870363" y="1063005"/>
+            <a:off x="6870363" y="1056655"/>
             <a:ext cx="2962812" cy="5019228"/>
           </a:xfrm>
           <a:prstGeom prst="rect">
@@ -16559,8 +16525,8 @@
         </p:nvSpPr>
         <p:spPr bwMode="auto">
           <a:xfrm>
-            <a:off x="8155044" y="2461100"/>
-            <a:ext cx="1767152" cy="246221"/>
+            <a:off x="8155044" y="2542510"/>
+            <a:ext cx="1767152" cy="276999"/>
           </a:xfrm>
           <a:prstGeom prst="rect">
             <a:avLst/>
@@ -16710,7 +16676,7 @@
               <a:defRPr/>
             </a:pPr>
             <a:r>
-              <a:rPr kumimoji="0" lang="en-US" altLang="en-US" sz="1000" b="0" i="0" u="none" strike="noStrike" kern="1200" cap="none" spc="0" normalizeH="0" baseline="0" noProof="0" dirty="0">
+              <a:rPr kumimoji="0" lang="en-US" altLang="en-US" sz="1200" b="0" i="0" u="none" strike="noStrike" kern="1200" cap="none" spc="0" normalizeH="0" baseline="0" noProof="0" dirty="0">
                 <a:ln>
                   <a:noFill/>
                 </a:ln>
@@ -16745,8 +16711,8 @@
         </p:nvSpPr>
         <p:spPr bwMode="auto">
           <a:xfrm>
-            <a:off x="8136535" y="4141720"/>
-            <a:ext cx="1767152" cy="246221"/>
+            <a:off x="8123835" y="4175054"/>
+            <a:ext cx="1767152" cy="276999"/>
           </a:xfrm>
           <a:prstGeom prst="rect">
             <a:avLst/>
@@ -16896,7 +16862,7 @@
               <a:defRPr/>
             </a:pPr>
             <a:r>
-              <a:rPr kumimoji="0" lang="en-US" altLang="en-US" sz="1000" b="0" i="0" u="none" strike="noStrike" kern="1200" cap="none" spc="0" normalizeH="0" baseline="0" noProof="0" dirty="0">
+              <a:rPr kumimoji="0" lang="en-US" altLang="en-US" sz="1200" b="0" i="0" u="none" strike="noStrike" kern="1200" cap="none" spc="0" normalizeH="0" baseline="0" noProof="0" dirty="0">
                 <a:ln>
                   <a:noFill/>
                 </a:ln>
@@ -16943,7 +16909,7 @@
         </p:blipFill>
         <p:spPr>
           <a:xfrm>
-            <a:off x="6928673" y="1616363"/>
+            <a:off x="6926292" y="1606839"/>
             <a:ext cx="309246" cy="309246"/>
           </a:xfrm>
           <a:prstGeom prst="rect">
@@ -16979,7 +16945,7 @@
         </p:blipFill>
         <p:spPr>
           <a:xfrm>
-            <a:off x="6917878" y="3094476"/>
+            <a:off x="6929783" y="3092095"/>
             <a:ext cx="381000" cy="381000"/>
           </a:xfrm>
           <a:prstGeom prst="rect">
@@ -17003,8 +16969,8 @@
         </p:nvSpPr>
         <p:spPr bwMode="auto">
           <a:xfrm>
-            <a:off x="4565884" y="1546730"/>
-            <a:ext cx="1403350" cy="246221"/>
+            <a:off x="4515084" y="1641980"/>
+            <a:ext cx="1403350" cy="276999"/>
           </a:xfrm>
           <a:prstGeom prst="rect">
             <a:avLst/>
@@ -17138,7 +17104,7 @@
           <a:p>
             <a:pPr algn="ctr" eaLnBrk="1" hangingPunct="1"/>
             <a:r>
-              <a:rPr lang="en-US" altLang="en-US" sz="1000" dirty="0">
+              <a:rPr lang="en-US" altLang="en-US" sz="1200" dirty="0">
                 <a:latin typeface="Arial" panose="020B0604020202020204" pitchFamily="34" charset="0"/>
                 <a:ea typeface="Amazon Ember" panose="020B0603020204020204" pitchFamily="34" charset="0"/>
                 <a:cs typeface="Arial" panose="020B0604020202020204" pitchFamily="34" charset="0"/>
@@ -17164,8 +17130,8 @@
         </p:nvSpPr>
         <p:spPr bwMode="auto">
           <a:xfrm>
-            <a:off x="559602" y="4076791"/>
-            <a:ext cx="1767152" cy="246221"/>
+            <a:off x="585062" y="4173948"/>
+            <a:ext cx="1767152" cy="276999"/>
           </a:xfrm>
           <a:prstGeom prst="rect">
             <a:avLst/>
@@ -17315,7 +17281,7 @@
               <a:defRPr/>
             </a:pPr>
             <a:r>
-              <a:rPr kumimoji="0" lang="en-US" altLang="en-US" sz="1000" b="0" i="0" u="none" strike="noStrike" kern="1200" cap="none" spc="0" normalizeH="0" baseline="0" noProof="0" dirty="0">
+              <a:rPr kumimoji="0" lang="en-US" altLang="en-US" sz="1200" b="0" i="0" u="none" strike="noStrike" kern="1200" cap="none" spc="0" normalizeH="0" baseline="0" noProof="0" dirty="0">
                 <a:ln>
                   <a:noFill/>
                 </a:ln>
@@ -17350,8 +17316,8 @@
         </p:nvSpPr>
         <p:spPr bwMode="auto">
           <a:xfrm>
-            <a:off x="6757649" y="4165219"/>
-            <a:ext cx="1434306" cy="246221"/>
+            <a:off x="6732249" y="4165219"/>
+            <a:ext cx="1434306" cy="276999"/>
           </a:xfrm>
           <a:prstGeom prst="rect">
             <a:avLst/>
@@ -17501,7 +17467,7 @@
               <a:defRPr/>
             </a:pPr>
             <a:r>
-              <a:rPr kumimoji="0" lang="en-US" altLang="en-US" sz="1000" b="0" i="0" u="none" strike="noStrike" kern="1200" cap="none" spc="0" normalizeH="0" baseline="0" noProof="0" dirty="0">
+              <a:rPr kumimoji="0" lang="en-US" altLang="en-US" sz="1200" b="0" i="0" u="none" strike="noStrike" kern="1200" cap="none" spc="0" normalizeH="0" baseline="0" noProof="0" dirty="0">
                 <a:ln>
                   <a:noFill/>
                 </a:ln>
@@ -17597,7 +17563,7 @@
         <p:spPr bwMode="auto">
           <a:xfrm>
             <a:off x="2136799" y="2542752"/>
-            <a:ext cx="1767152" cy="246221"/>
+            <a:ext cx="1767152" cy="276999"/>
           </a:xfrm>
           <a:prstGeom prst="rect">
             <a:avLst/>
@@ -17747,7 +17713,7 @@
               <a:defRPr/>
             </a:pPr>
             <a:r>
-              <a:rPr kumimoji="0" lang="en-US" altLang="en-US" sz="1000" b="0" i="0" u="none" strike="noStrike" kern="1200" cap="none" spc="0" normalizeH="0" baseline="0" noProof="0" dirty="0">
+              <a:rPr kumimoji="0" lang="en-US" altLang="en-US" sz="1200" b="0" i="0" u="none" strike="noStrike" kern="1200" cap="none" spc="0" normalizeH="0" baseline="0" noProof="0" dirty="0">
                 <a:ln>
                   <a:noFill/>
                 </a:ln>
@@ -17795,7 +17761,7 @@
         </p:blipFill>
         <p:spPr bwMode="auto">
           <a:xfrm>
-            <a:off x="7188527" y="2058493"/>
+            <a:off x="7188527" y="2083893"/>
             <a:ext cx="469900" cy="469900"/>
           </a:xfrm>
           <a:prstGeom prst="rect">
@@ -17842,8 +17808,8 @@
         </p:nvSpPr>
         <p:spPr bwMode="auto">
           <a:xfrm>
-            <a:off x="6539518" y="2503863"/>
-            <a:ext cx="1767152" cy="246221"/>
+            <a:off x="6539518" y="2529263"/>
+            <a:ext cx="1767152" cy="276999"/>
           </a:xfrm>
           <a:prstGeom prst="rect">
             <a:avLst/>
@@ -17993,7 +17959,7 @@
               <a:defRPr/>
             </a:pPr>
             <a:r>
-              <a:rPr kumimoji="0" lang="en-US" altLang="en-US" sz="1000" b="0" i="0" u="none" strike="noStrike" kern="1200" cap="none" spc="0" normalizeH="0" baseline="0" noProof="0" dirty="0">
+              <a:rPr kumimoji="0" lang="en-US" altLang="en-US" sz="1200" b="0" i="0" u="none" strike="noStrike" kern="1200" cap="none" spc="0" normalizeH="0" baseline="0" noProof="0" dirty="0">
                 <a:ln>
                   <a:noFill/>
                 </a:ln>
@@ -18144,7 +18110,7 @@
               <a:defRPr/>
             </a:pPr>
             <a:r>
-              <a:rPr kumimoji="0" lang="en-US" sz="1000" b="0" i="0" u="none" strike="noStrike" kern="1200" cap="none" spc="0" normalizeH="0" baseline="0" noProof="0" dirty="0">
+              <a:rPr kumimoji="0" lang="en-US" sz="1200" b="0" i="0" u="none" strike="noStrike" kern="1200" cap="none" spc="0" normalizeH="0" baseline="0" noProof="0" dirty="0">
                 <a:ln>
                   <a:noFill/>
                 </a:ln>
@@ -18179,8 +18145,8 @@
         </p:nvSpPr>
         <p:spPr bwMode="auto">
           <a:xfrm>
-            <a:off x="4612335" y="3290204"/>
-            <a:ext cx="1255028" cy="400110"/>
+            <a:off x="3846000" y="3290204"/>
+            <a:ext cx="2789696" cy="276999"/>
           </a:xfrm>
           <a:prstGeom prst="rect">
             <a:avLst/>
@@ -18314,27 +18280,12 @@
           <a:p>
             <a:pPr algn="ctr" eaLnBrk="1" hangingPunct="1"/>
             <a:r>
-              <a:rPr lang="en-US" altLang="en-US" sz="1000" dirty="0">
+              <a:rPr lang="en-US" altLang="en-US" sz="1200" dirty="0">
                 <a:latin typeface="Arial" panose="020B0604020202020204" pitchFamily="34" charset="0"/>
                 <a:ea typeface="Amazon Ember" panose="020B0603020204020204" pitchFamily="34" charset="0"/>
                 <a:cs typeface="Arial" panose="020B0604020202020204" pitchFamily="34" charset="0"/>
               </a:rPr>
-              <a:t>Application Load </a:t>
-            </a:r>
-            <a:br>
-              <a:rPr lang="en-US" altLang="en-US" sz="1000" dirty="0">
-                <a:latin typeface="Arial" panose="020B0604020202020204" pitchFamily="34" charset="0"/>
-                <a:ea typeface="Amazon Ember" panose="020B0603020204020204" pitchFamily="34" charset="0"/>
-                <a:cs typeface="Arial" panose="020B0604020202020204" pitchFamily="34" charset="0"/>
-              </a:rPr>
-            </a:br>
-            <a:r>
-              <a:rPr lang="en-US" altLang="en-US" sz="1000" dirty="0">
-                <a:latin typeface="Arial" panose="020B0604020202020204" pitchFamily="34" charset="0"/>
-                <a:ea typeface="Amazon Ember" panose="020B0603020204020204" pitchFamily="34" charset="0"/>
-                <a:cs typeface="Arial" panose="020B0604020202020204" pitchFamily="34" charset="0"/>
-              </a:rPr>
-              <a:t>Balancer</a:t>
+              <a:t>Application Load Balancer</a:t>
             </a:r>
           </a:p>
         </p:txBody>
@@ -18458,7 +18409,7 @@
         </p:blipFill>
         <p:spPr bwMode="auto">
           <a:xfrm>
-            <a:off x="1753882" y="2094384"/>
+            <a:off x="1162459" y="2121186"/>
             <a:ext cx="469900" cy="469900"/>
           </a:xfrm>
           <a:prstGeom prst="rect">
@@ -18517,7 +18468,7 @@
         </p:blipFill>
         <p:spPr>
           <a:xfrm>
-            <a:off x="4982958" y="2029253"/>
+            <a:off x="5008358" y="2026870"/>
             <a:ext cx="381000" cy="381000"/>
           </a:xfrm>
           <a:prstGeom prst="rect">
@@ -18553,7 +18504,7 @@
         </p:blipFill>
         <p:spPr>
           <a:xfrm>
-            <a:off x="5077059" y="3712520"/>
+            <a:off x="5032609" y="3693470"/>
             <a:ext cx="381000" cy="381000"/>
           </a:xfrm>
           <a:prstGeom prst="rect">
@@ -18590,7 +18541,7 @@
         </p:blipFill>
         <p:spPr bwMode="auto">
           <a:xfrm>
-            <a:off x="8714639" y="1986780"/>
+            <a:off x="8764674" y="2087542"/>
             <a:ext cx="469900" cy="469900"/>
           </a:xfrm>
           <a:prstGeom prst="rect">
@@ -18650,7 +18601,7 @@
         </p:blipFill>
         <p:spPr bwMode="auto">
           <a:xfrm>
-            <a:off x="7147891" y="3683091"/>
+            <a:off x="7211391" y="3710870"/>
             <a:ext cx="469900" cy="469900"/>
           </a:xfrm>
           <a:prstGeom prst="rect">
@@ -18710,7 +18661,7 @@
         </p:blipFill>
         <p:spPr bwMode="auto">
           <a:xfrm>
-            <a:off x="8785161" y="3641907"/>
+            <a:off x="8770187" y="3715725"/>
             <a:ext cx="469900" cy="469900"/>
           </a:xfrm>
           <a:prstGeom prst="rect">
@@ -18770,7 +18721,7 @@
         </p:blipFill>
         <p:spPr bwMode="auto">
           <a:xfrm>
-            <a:off x="2790167" y="3708618"/>
+            <a:off x="2796517" y="3708618"/>
             <a:ext cx="469900" cy="469900"/>
           </a:xfrm>
           <a:prstGeom prst="rect">
@@ -18830,7 +18781,7 @@
         </p:blipFill>
         <p:spPr bwMode="auto">
           <a:xfrm>
-            <a:off x="1033620" y="3619119"/>
+            <a:off x="1176505" y="3745469"/>
             <a:ext cx="469900" cy="469900"/>
           </a:xfrm>
           <a:prstGeom prst="rect">
@@ -18863,10 +18814,10 @@
       </p:pic>
       <p:pic>
         <p:nvPicPr>
-          <p:cNvPr id="13" name="Graphic 10">
-            <a:extLst>
-              <a:ext uri="{FF2B5EF4-FFF2-40B4-BE49-F238E27FC236}">
-                <a16:creationId xmlns:a16="http://schemas.microsoft.com/office/drawing/2014/main" id="{DFD3EEB9-FBB2-FFC8-006E-A3D192BA2F46}"/>
+          <p:cNvPr id="14" name="Graphic 8">
+            <a:extLst>
+              <a:ext uri="{FF2B5EF4-FFF2-40B4-BE49-F238E27FC236}">
+                <a16:creationId xmlns:a16="http://schemas.microsoft.com/office/drawing/2014/main" id="{D1B554F6-CD6E-9E33-52C7-F59A0DC7673A}"/>
               </a:ext>
             </a:extLst>
           </p:cNvPr>
@@ -18890,7 +18841,7 @@
         </p:blipFill>
         <p:spPr bwMode="auto">
           <a:xfrm>
-            <a:off x="5038959" y="1147767"/>
+            <a:off x="4984394" y="2865599"/>
             <a:ext cx="457200" cy="457200"/>
           </a:xfrm>
           <a:prstGeom prst="rect">
@@ -18923,10 +18874,10 @@
       </p:pic>
       <p:pic>
         <p:nvPicPr>
-          <p:cNvPr id="14" name="Graphic 8">
-            <a:extLst>
-              <a:ext uri="{FF2B5EF4-FFF2-40B4-BE49-F238E27FC236}">
-                <a16:creationId xmlns:a16="http://schemas.microsoft.com/office/drawing/2014/main" id="{D1B554F6-CD6E-9E33-52C7-F59A0DC7673A}"/>
+          <p:cNvPr id="15" name="Graphic 7">
+            <a:extLst>
+              <a:ext uri="{FF2B5EF4-FFF2-40B4-BE49-F238E27FC236}">
+                <a16:creationId xmlns:a16="http://schemas.microsoft.com/office/drawing/2014/main" id="{15DB8C92-F348-CD3D-F320-6008EA6CFD4C}"/>
               </a:ext>
             </a:extLst>
           </p:cNvPr>
@@ -18950,8 +18901,8 @@
         </p:blipFill>
         <p:spPr bwMode="auto">
           <a:xfrm>
-            <a:off x="5016144" y="2865599"/>
-            <a:ext cx="457200" cy="457200"/>
+            <a:off x="1024219" y="4624190"/>
+            <a:ext cx="762000" cy="762000"/>
           </a:xfrm>
           <a:prstGeom prst="rect">
             <a:avLst/>
@@ -18981,66 +18932,6 @@
           </a:extLst>
         </p:spPr>
       </p:pic>
-      <p:pic>
-        <p:nvPicPr>
-          <p:cNvPr id="15" name="Graphic 7">
-            <a:extLst>
-              <a:ext uri="{FF2B5EF4-FFF2-40B4-BE49-F238E27FC236}">
-                <a16:creationId xmlns:a16="http://schemas.microsoft.com/office/drawing/2014/main" id="{15DB8C92-F348-CD3D-F320-6008EA6CFD4C}"/>
-              </a:ext>
-            </a:extLst>
-          </p:cNvPr>
-          <p:cNvPicPr>
-            <a:picLocks noChangeAspect="1" noChangeArrowheads="1"/>
-          </p:cNvPicPr>
-          <p:nvPr/>
-        </p:nvPicPr>
-        <p:blipFill>
-          <a:blip r:embed="rId16">
-            <a:extLst>
-              <a:ext uri="{28A0092B-C50C-407E-A947-70E740481C1C}">
-                <a14:useLocalDpi xmlns:a14="http://schemas.microsoft.com/office/drawing/2010/main" val="0"/>
-              </a:ext>
-            </a:extLst>
-          </a:blip>
-          <a:srcRect/>
-          <a:stretch>
-            <a:fillRect/>
-          </a:stretch>
-        </p:blipFill>
-        <p:spPr bwMode="auto">
-          <a:xfrm>
-            <a:off x="967069" y="4579740"/>
-            <a:ext cx="762000" cy="762000"/>
-          </a:xfrm>
-          <a:prstGeom prst="rect">
-            <a:avLst/>
-          </a:prstGeom>
-          <a:noFill/>
-          <a:ln>
-            <a:noFill/>
-          </a:ln>
-          <a:extLst>
-            <a:ext uri="{909E8E84-426E-40DD-AFC4-6F175D3DCCD1}">
-              <a14:hiddenFill xmlns:a14="http://schemas.microsoft.com/office/drawing/2010/main">
-                <a:solidFill>
-                  <a:srgbClr val="FFFFFF"/>
-                </a:solidFill>
-              </a14:hiddenFill>
-            </a:ext>
-            <a:ext uri="{91240B29-F687-4F45-9708-019B960494DF}">
-              <a14:hiddenLine xmlns:a14="http://schemas.microsoft.com/office/drawing/2010/main" w="9525">
-                <a:solidFill>
-                  <a:srgbClr val="000000"/>
-                </a:solidFill>
-                <a:miter lim="800000"/>
-                <a:headEnd/>
-                <a:tailEnd/>
-              </a14:hiddenLine>
-            </a:ext>
-          </a:extLst>
-        </p:spPr>
-      </p:pic>
       <p:sp>
         <p:nvSpPr>
           <p:cNvPr id="16" name="TextBox 9">
@@ -19057,7 +18948,7 @@
         </p:nvSpPr>
         <p:spPr bwMode="auto">
           <a:xfrm>
-            <a:off x="217769" y="5343327"/>
+            <a:off x="274919" y="5381427"/>
             <a:ext cx="2243137" cy="276999"/>
           </a:xfrm>
           <a:prstGeom prst="rect">
@@ -19217,7 +19108,7 @@
           <p:nvPr/>
         </p:nvPicPr>
         <p:blipFill>
-          <a:blip r:embed="rId17">
+          <a:blip r:embed="rId16">
             <a:extLst>
               <a:ext uri="{28A0092B-C50C-407E-A947-70E740481C1C}">
                 <a14:useLocalDpi xmlns:a14="http://schemas.microsoft.com/office/drawing/2010/main" val="0"/>
@@ -19231,7 +19122,7 @@
         </p:blipFill>
         <p:spPr bwMode="auto">
           <a:xfrm>
-            <a:off x="2392178" y="4600943"/>
+            <a:off x="2423928" y="4619993"/>
             <a:ext cx="762000" cy="762000"/>
           </a:xfrm>
           <a:prstGeom prst="rect">
@@ -19278,7 +19169,7 @@
         </p:nvSpPr>
         <p:spPr bwMode="auto">
           <a:xfrm>
-            <a:off x="1634941" y="5361355"/>
+            <a:off x="1634941" y="5380405"/>
             <a:ext cx="2292350" cy="276999"/>
           </a:xfrm>
           <a:prstGeom prst="rect">
@@ -19438,7 +19329,7 @@
           <p:nvPr/>
         </p:nvPicPr>
         <p:blipFill>
-          <a:blip r:embed="rId17">
+          <a:blip r:embed="rId16">
             <a:extLst>
               <a:ext uri="{28A0092B-C50C-407E-A947-70E740481C1C}">
                 <a14:useLocalDpi xmlns:a14="http://schemas.microsoft.com/office/drawing/2010/main" val="0"/>
@@ -19452,7 +19343,7 @@
         </p:blipFill>
         <p:spPr bwMode="auto">
           <a:xfrm>
-            <a:off x="7371482" y="4628122"/>
+            <a:off x="7320682" y="4583672"/>
             <a:ext cx="762000" cy="762000"/>
           </a:xfrm>
           <a:prstGeom prst="rect">
@@ -19499,7 +19390,7 @@
         </p:nvSpPr>
         <p:spPr bwMode="auto">
           <a:xfrm>
-            <a:off x="6614245" y="5388534"/>
+            <a:off x="6557095" y="5363134"/>
             <a:ext cx="2292350" cy="276999"/>
           </a:xfrm>
           <a:prstGeom prst="rect">
@@ -19661,7 +19552,7 @@
         <p:spPr bwMode="auto">
           <a:xfrm>
             <a:off x="4550010" y="5305141"/>
-            <a:ext cx="1343025" cy="261610"/>
+            <a:ext cx="1343025" cy="276999"/>
           </a:xfrm>
           <a:prstGeom prst="rect">
             <a:avLst/>
@@ -19795,7 +19686,7 @@
           <a:p>
             <a:pPr algn="ctr" eaLnBrk="1" hangingPunct="1"/>
             <a:r>
-              <a:rPr lang="en-US" altLang="en-US" sz="1100" dirty="0">
+              <a:rPr lang="en-US" altLang="en-US" sz="1200" dirty="0">
                 <a:latin typeface="Arial" panose="020B0604020202020204" pitchFamily="34" charset="0"/>
                 <a:ea typeface="Amazon Ember" panose="020B0603020204020204" pitchFamily="34" charset="0"/>
                 <a:cs typeface="Arial" panose="020B0604020202020204" pitchFamily="34" charset="0"/>
@@ -19811,6 +19702,66 @@
             <a:extLst>
               <a:ext uri="{FF2B5EF4-FFF2-40B4-BE49-F238E27FC236}">
                 <a16:creationId xmlns:a16="http://schemas.microsoft.com/office/drawing/2014/main" id="{3D8D04F0-80BE-B516-F498-00D26865DB4B}"/>
+              </a:ext>
+            </a:extLst>
+          </p:cNvPr>
+          <p:cNvPicPr>
+            <a:picLocks noChangeAspect="1" noChangeArrowheads="1"/>
+          </p:cNvPicPr>
+          <p:nvPr/>
+        </p:nvPicPr>
+        <p:blipFill>
+          <a:blip r:embed="rId17">
+            <a:extLst>
+              <a:ext uri="{28A0092B-C50C-407E-A947-70E740481C1C}">
+                <a14:useLocalDpi xmlns:a14="http://schemas.microsoft.com/office/drawing/2010/main" val="0"/>
+              </a:ext>
+            </a:extLst>
+          </a:blip>
+          <a:srcRect/>
+          <a:stretch>
+            <a:fillRect/>
+          </a:stretch>
+        </p:blipFill>
+        <p:spPr bwMode="auto">
+          <a:xfrm>
+            <a:off x="5012248" y="4847941"/>
+            <a:ext cx="457200" cy="457200"/>
+          </a:xfrm>
+          <a:prstGeom prst="rect">
+            <a:avLst/>
+          </a:prstGeom>
+          <a:noFill/>
+          <a:ln>
+            <a:noFill/>
+          </a:ln>
+          <a:extLst>
+            <a:ext uri="{909E8E84-426E-40DD-AFC4-6F175D3DCCD1}">
+              <a14:hiddenFill xmlns:a14="http://schemas.microsoft.com/office/drawing/2010/main">
+                <a:solidFill>
+                  <a:srgbClr val="FFFFFF"/>
+                </a:solidFill>
+              </a14:hiddenFill>
+            </a:ext>
+            <a:ext uri="{91240B29-F687-4F45-9708-019B960494DF}">
+              <a14:hiddenLine xmlns:a14="http://schemas.microsoft.com/office/drawing/2010/main" w="9525">
+                <a:solidFill>
+                  <a:srgbClr val="000000"/>
+                </a:solidFill>
+                <a:miter lim="800000"/>
+                <a:headEnd/>
+                <a:tailEnd/>
+              </a14:hiddenLine>
+            </a:ext>
+          </a:extLst>
+        </p:spPr>
+      </p:pic>
+      <p:pic>
+        <p:nvPicPr>
+          <p:cNvPr id="23" name="Graphic 7">
+            <a:extLst>
+              <a:ext uri="{FF2B5EF4-FFF2-40B4-BE49-F238E27FC236}">
+                <a16:creationId xmlns:a16="http://schemas.microsoft.com/office/drawing/2014/main" id="{331A1279-6BE8-9A72-6B2E-84F10C607B28}"/>
               </a:ext>
             </a:extLst>
           </p:cNvPr>
@@ -19821,66 +19772,6 @@
         </p:nvPicPr>
         <p:blipFill>
           <a:blip r:embed="rId18">
-            <a:extLst>
-              <a:ext uri="{28A0092B-C50C-407E-A947-70E740481C1C}">
-                <a14:useLocalDpi xmlns:a14="http://schemas.microsoft.com/office/drawing/2010/main" val="0"/>
-              </a:ext>
-            </a:extLst>
-          </a:blip>
-          <a:srcRect/>
-          <a:stretch>
-            <a:fillRect/>
-          </a:stretch>
-        </p:blipFill>
-        <p:spPr bwMode="auto">
-          <a:xfrm>
-            <a:off x="5012248" y="4847941"/>
-            <a:ext cx="457200" cy="457200"/>
-          </a:xfrm>
-          <a:prstGeom prst="rect">
-            <a:avLst/>
-          </a:prstGeom>
-          <a:noFill/>
-          <a:ln>
-            <a:noFill/>
-          </a:ln>
-          <a:extLst>
-            <a:ext uri="{909E8E84-426E-40DD-AFC4-6F175D3DCCD1}">
-              <a14:hiddenFill xmlns:a14="http://schemas.microsoft.com/office/drawing/2010/main">
-                <a:solidFill>
-                  <a:srgbClr val="FFFFFF"/>
-                </a:solidFill>
-              </a14:hiddenFill>
-            </a:ext>
-            <a:ext uri="{91240B29-F687-4F45-9708-019B960494DF}">
-              <a14:hiddenLine xmlns:a14="http://schemas.microsoft.com/office/drawing/2010/main" w="9525">
-                <a:solidFill>
-                  <a:srgbClr val="000000"/>
-                </a:solidFill>
-                <a:miter lim="800000"/>
-                <a:headEnd/>
-                <a:tailEnd/>
-              </a14:hiddenLine>
-            </a:ext>
-          </a:extLst>
-        </p:spPr>
-      </p:pic>
-      <p:pic>
-        <p:nvPicPr>
-          <p:cNvPr id="23" name="Graphic 7">
-            <a:extLst>
-              <a:ext uri="{FF2B5EF4-FFF2-40B4-BE49-F238E27FC236}">
-                <a16:creationId xmlns:a16="http://schemas.microsoft.com/office/drawing/2014/main" id="{331A1279-6BE8-9A72-6B2E-84F10C607B28}"/>
-              </a:ext>
-            </a:extLst>
-          </p:cNvPr>
-          <p:cNvPicPr>
-            <a:picLocks noChangeAspect="1" noChangeArrowheads="1"/>
-          </p:cNvPicPr>
-          <p:nvPr/>
-        </p:nvPicPr>
-        <p:blipFill>
-          <a:blip r:embed="rId19">
             <a:extLst>
               <a:ext uri="{28A0092B-C50C-407E-A947-70E740481C1C}">
                 <a14:useLocalDpi xmlns:a14="http://schemas.microsoft.com/office/drawing/2010/main" val="0"/>
@@ -20101,7 +19992,7 @@
           <p:nvPr/>
         </p:nvPicPr>
         <p:blipFill>
-          <a:blip r:embed="rId20">
+          <a:blip r:embed="rId19">
             <a:extLst>
               <a:ext uri="{28A0092B-C50C-407E-A947-70E740481C1C}">
                 <a14:useLocalDpi xmlns:a14="http://schemas.microsoft.com/office/drawing/2010/main" val="0"/>
@@ -20322,7 +20213,7 @@
           <p:nvPr/>
         </p:nvPicPr>
         <p:blipFill>
-          <a:blip r:embed="rId21">
+          <a:blip r:embed="rId20">
             <a:extLst>
               <a:ext uri="{28A0092B-C50C-407E-A947-70E740481C1C}">
                 <a14:useLocalDpi xmlns:a14="http://schemas.microsoft.com/office/drawing/2010/main" val="0"/>
@@ -20543,7 +20434,7 @@
           <p:nvPr/>
         </p:nvPicPr>
         <p:blipFill>
-          <a:blip r:embed="rId22">
+          <a:blip r:embed="rId21">
             <a:extLst>
               <a:ext uri="{28A0092B-C50C-407E-A947-70E740481C1C}">
                 <a14:useLocalDpi xmlns:a14="http://schemas.microsoft.com/office/drawing/2010/main" val="0"/>
@@ -20764,7 +20655,7 @@
           <p:nvPr/>
         </p:nvPicPr>
         <p:blipFill>
-          <a:blip r:embed="rId23">
+          <a:blip r:embed="rId22">
             <a:extLst>
               <a:ext uri="{28A0092B-C50C-407E-A947-70E740481C1C}">
                 <a14:useLocalDpi xmlns:a14="http://schemas.microsoft.com/office/drawing/2010/main" val="0"/>
@@ -20970,6 +20861,49 @@
           </a:p>
         </p:txBody>
       </p:sp>
+      <p:pic>
+        <p:nvPicPr>
+          <p:cNvPr id="13" name="Graphic 10">
+            <a:extLst>
+              <a:ext uri="{FF2B5EF4-FFF2-40B4-BE49-F238E27FC236}">
+                <a16:creationId xmlns:a16="http://schemas.microsoft.com/office/drawing/2014/main" id="{DFD3EEB9-FBB2-FFC8-006E-A3D192BA2F46}"/>
+              </a:ext>
+            </a:extLst>
+          </p:cNvPr>
+          <p:cNvPicPr>
+            <a:picLocks noChangeAspect="1" noChangeArrowheads="1"/>
+          </p:cNvPicPr>
+          <p:nvPr/>
+        </p:nvPicPr>
+        <p:blipFill>
+          <a:blip r:embed="rId23">
+            <a:extLst>
+              <a:ext uri="{28A0092B-C50C-407E-A947-70E740481C1C}">
+                <a14:useLocalDpi xmlns:a14="http://schemas.microsoft.com/office/drawing/2010/main" val="0"/>
+              </a:ext>
+            </a:extLst>
+          </a:blip>
+          <a:srcRect/>
+          <a:stretch>
+            <a:fillRect/>
+          </a:stretch>
+        </p:blipFill>
+        <p:spPr bwMode="auto">
+          <a:xfrm>
+            <a:off x="4975459" y="1147767"/>
+            <a:ext cx="457200" cy="457200"/>
+          </a:xfrm>
+          <a:prstGeom prst="rect">
+            <a:avLst/>
+          </a:prstGeom>
+          <a:solidFill>
+            <a:schemeClr val="bg1"/>
+          </a:solidFill>
+          <a:ln>
+            <a:noFill/>
+          </a:ln>
+        </p:spPr>
+      </p:pic>
     </p:spTree>
     <p:extLst>
       <p:ext uri="{BB962C8B-B14F-4D97-AF65-F5344CB8AC3E}">
@@ -22240,7 +22174,7 @@
         </p:blipFill>
         <p:spPr>
           <a:xfrm>
-            <a:off x="1060220" y="2094594"/>
+            <a:off x="1060220" y="2080308"/>
             <a:ext cx="295194" cy="295194"/>
           </a:xfrm>
           <a:prstGeom prst="rect">
@@ -22276,7 +22210,7 @@
         </p:blipFill>
         <p:spPr>
           <a:xfrm>
-            <a:off x="1049425" y="3489581"/>
+            <a:off x="1058949" y="3489581"/>
             <a:ext cx="381000" cy="381000"/>
           </a:xfrm>
           <a:prstGeom prst="rect">
@@ -22298,7 +22232,7 @@
         </p:nvSpPr>
         <p:spPr>
           <a:xfrm>
-            <a:off x="7205675" y="3449247"/>
+            <a:off x="7205675" y="3451628"/>
             <a:ext cx="2760031" cy="2989603"/>
           </a:xfrm>
           <a:prstGeom prst="rect">
@@ -22529,7 +22463,7 @@
         </p:nvSpPr>
         <p:spPr bwMode="auto">
           <a:xfrm>
-            <a:off x="8429364" y="2817716"/>
+            <a:off x="8429364" y="2870100"/>
             <a:ext cx="1767152" cy="246221"/>
           </a:xfrm>
           <a:prstGeom prst="rect">
@@ -22727,7 +22661,7 @@
         </p:blipFill>
         <p:spPr>
           <a:xfrm>
-            <a:off x="7202993" y="1972979"/>
+            <a:off x="7202993" y="1963455"/>
             <a:ext cx="309246" cy="309246"/>
           </a:xfrm>
           <a:prstGeom prst="rect">
@@ -22763,7 +22697,7 @@
         </p:blipFill>
         <p:spPr>
           <a:xfrm>
-            <a:off x="7192198" y="3451092"/>
+            <a:off x="7204103" y="3451092"/>
             <a:ext cx="381000" cy="381000"/>
           </a:xfrm>
           <a:prstGeom prst="rect">
@@ -24211,7 +24145,7 @@
         </p:blipFill>
         <p:spPr>
           <a:xfrm>
-            <a:off x="5257278" y="2385869"/>
+            <a:off x="5257278" y="2402536"/>
             <a:ext cx="381000" cy="381000"/>
           </a:xfrm>
           <a:prstGeom prst="rect">
@@ -24284,7 +24218,7 @@
         </p:blipFill>
         <p:spPr bwMode="auto">
           <a:xfrm>
-            <a:off x="8988959" y="2343396"/>
+            <a:off x="8988959" y="2410067"/>
             <a:ext cx="469900" cy="469900"/>
           </a:xfrm>
           <a:prstGeom prst="rect">
@@ -24344,7 +24278,7 @@
         </p:blipFill>
         <p:spPr bwMode="auto">
           <a:xfrm>
-            <a:off x="7422211" y="4039707"/>
+            <a:off x="7422211" y="4063517"/>
             <a:ext cx="469900" cy="469900"/>
           </a:xfrm>
           <a:prstGeom prst="rect">
@@ -25134,7 +25068,7 @@
         <p:spPr bwMode="auto">
           <a:xfrm>
             <a:off x="6888565" y="6138850"/>
-            <a:ext cx="2292350" cy="276999"/>
+            <a:ext cx="2292350" cy="246221"/>
           </a:xfrm>
           <a:prstGeom prst="rect">
             <a:avLst/>
@@ -25268,7 +25202,7 @@
           <a:p>
             <a:pPr algn="ctr" eaLnBrk="1" hangingPunct="1"/>
             <a:r>
-              <a:rPr lang="en-US" altLang="en-US" sz="1200" dirty="0">
+              <a:rPr lang="en-US" altLang="en-US" sz="1000" dirty="0">
                 <a:latin typeface="Arial" panose="020B0604020202020204" pitchFamily="34" charset="0"/>
                 <a:ea typeface="Amazon Ember" panose="020B0603020204020204" pitchFamily="34" charset="0"/>
                 <a:cs typeface="Arial" panose="020B0604020202020204" pitchFamily="34" charset="0"/>
@@ -26399,8 +26333,8 @@
         </p:nvSpPr>
         <p:spPr bwMode="auto">
           <a:xfrm>
-            <a:off x="8397367" y="4336623"/>
-            <a:ext cx="1343025" cy="430887"/>
+            <a:off x="8397367" y="4467586"/>
+            <a:ext cx="1343025" cy="400110"/>
           </a:xfrm>
           <a:prstGeom prst="rect">
             <a:avLst/>
@@ -26534,7 +26468,7 @@
           <a:p>
             <a:pPr algn="ctr" eaLnBrk="1" hangingPunct="1"/>
             <a:r>
-              <a:rPr lang="en-US" altLang="en-US" sz="1100" dirty="0">
+              <a:rPr lang="en-US" altLang="en-US" sz="1000" dirty="0">
                 <a:latin typeface="Arial" panose="020B0604020202020204" pitchFamily="34" charset="0"/>
                 <a:ea typeface="Amazon Ember" panose="020B0603020204020204" pitchFamily="34" charset="0"/>
                 <a:cs typeface="Arial" panose="020B0604020202020204" pitchFamily="34" charset="0"/>
@@ -26542,14 +26476,14 @@
               <a:t>AWS Managed</a:t>
             </a:r>
             <a:br>
-              <a:rPr lang="en-US" altLang="en-US" sz="1100" dirty="0">
+              <a:rPr lang="en-US" altLang="en-US" sz="1000" dirty="0">
                 <a:latin typeface="Arial" panose="020B0604020202020204" pitchFamily="34" charset="0"/>
                 <a:ea typeface="Amazon Ember" panose="020B0603020204020204" pitchFamily="34" charset="0"/>
                 <a:cs typeface="Arial" panose="020B0604020202020204" pitchFamily="34" charset="0"/>
               </a:rPr>
             </a:br>
             <a:r>
-              <a:rPr lang="en-US" altLang="en-US" sz="1100" dirty="0">
+              <a:rPr lang="en-US" altLang="en-US" sz="1000" dirty="0">
                 <a:latin typeface="Arial" panose="020B0604020202020204" pitchFamily="34" charset="0"/>
                 <a:ea typeface="Amazon Ember" panose="020B0603020204020204" pitchFamily="34" charset="0"/>
                 <a:cs typeface="Arial" panose="020B0604020202020204" pitchFamily="34" charset="0"/>
@@ -26588,7 +26522,7 @@
         </p:blipFill>
         <p:spPr bwMode="auto">
           <a:xfrm>
-            <a:off x="8846905" y="3879423"/>
+            <a:off x="8846905" y="4086594"/>
             <a:ext cx="457200" cy="457200"/>
           </a:xfrm>
           <a:prstGeom prst="rect">
@@ -27933,7 +27867,7 @@
         </p:blipFill>
         <p:spPr>
           <a:xfrm>
-            <a:off x="1060220" y="2094594"/>
+            <a:off x="1060220" y="2077927"/>
             <a:ext cx="295194" cy="295194"/>
           </a:xfrm>
           <a:prstGeom prst="rect">
@@ -27969,7 +27903,7 @@
         </p:blipFill>
         <p:spPr>
           <a:xfrm>
-            <a:off x="1049425" y="3489581"/>
+            <a:off x="1058949" y="3489581"/>
             <a:ext cx="381000" cy="381000"/>
           </a:xfrm>
           <a:prstGeom prst="rect">
@@ -28222,7 +28156,7 @@
         </p:nvSpPr>
         <p:spPr bwMode="auto">
           <a:xfrm>
-            <a:off x="8429364" y="2817716"/>
+            <a:off x="8429364" y="2870103"/>
             <a:ext cx="1767152" cy="246221"/>
           </a:xfrm>
           <a:prstGeom prst="rect">
@@ -28420,7 +28354,7 @@
         </p:blipFill>
         <p:spPr>
           <a:xfrm>
-            <a:off x="7202993" y="1972979"/>
+            <a:off x="7202993" y="1963455"/>
             <a:ext cx="309246" cy="309246"/>
           </a:xfrm>
           <a:prstGeom prst="rect">
@@ -28456,7 +28390,7 @@
         </p:blipFill>
         <p:spPr>
           <a:xfrm>
-            <a:off x="7192198" y="3451092"/>
+            <a:off x="7206484" y="3451092"/>
             <a:ext cx="381000" cy="381000"/>
           </a:xfrm>
           <a:prstGeom prst="rect">
@@ -29086,7 +29020,7 @@
         </p:blipFill>
         <p:spPr bwMode="auto">
           <a:xfrm>
-            <a:off x="7462847" y="2415109"/>
+            <a:off x="7462847" y="2403204"/>
             <a:ext cx="469900" cy="469900"/>
           </a:xfrm>
           <a:prstGeom prst="rect">
@@ -29808,7 +29742,7 @@
         </p:blipFill>
         <p:spPr>
           <a:xfrm>
-            <a:off x="5257278" y="2385869"/>
+            <a:off x="5257278" y="2402536"/>
             <a:ext cx="381000" cy="381000"/>
           </a:xfrm>
           <a:prstGeom prst="rect">
@@ -29844,7 +29778,7 @@
         </p:blipFill>
         <p:spPr>
           <a:xfrm>
-            <a:off x="5351379" y="4069136"/>
+            <a:off x="5351379" y="4071517"/>
             <a:ext cx="381000" cy="381000"/>
           </a:xfrm>
           <a:prstGeom prst="rect">
@@ -29881,7 +29815,7 @@
         </p:blipFill>
         <p:spPr bwMode="auto">
           <a:xfrm>
-            <a:off x="8988959" y="2343396"/>
+            <a:off x="8988959" y="2407686"/>
             <a:ext cx="469900" cy="469900"/>
           </a:xfrm>
           <a:prstGeom prst="rect">
@@ -29941,7 +29875,7 @@
         </p:blipFill>
         <p:spPr bwMode="auto">
           <a:xfrm>
-            <a:off x="7422211" y="4039707"/>
+            <a:off x="7422211" y="4065898"/>
             <a:ext cx="469900" cy="469900"/>
           </a:xfrm>
           <a:prstGeom prst="rect">
@@ -30229,7 +30163,7 @@
         <p:spPr bwMode="auto">
           <a:xfrm>
             <a:off x="542889" y="4963343"/>
-            <a:ext cx="2243137" cy="276999"/>
+            <a:ext cx="2243137" cy="246221"/>
           </a:xfrm>
           <a:prstGeom prst="rect">
             <a:avLst/>
@@ -30363,7 +30297,7 @@
           <a:p>
             <a:pPr algn="ctr" eaLnBrk="1" hangingPunct="1"/>
             <a:r>
-              <a:rPr lang="en-US" altLang="en-US" sz="1200" dirty="0">
+              <a:rPr lang="en-US" altLang="en-US" sz="1000" dirty="0">
                 <a:latin typeface="Arial" panose="020B0604020202020204" pitchFamily="34" charset="0"/>
                 <a:ea typeface="Amazon Ember" panose="020B0603020204020204" pitchFamily="34" charset="0"/>
                 <a:cs typeface="Arial" panose="020B0604020202020204" pitchFamily="34" charset="0"/>
@@ -30450,7 +30384,7 @@
         <p:spPr bwMode="auto">
           <a:xfrm>
             <a:off x="1909261" y="5717971"/>
-            <a:ext cx="2292350" cy="276999"/>
+            <a:ext cx="2292350" cy="246221"/>
           </a:xfrm>
           <a:prstGeom prst="rect">
             <a:avLst/>
@@ -30584,7 +30518,7 @@
           <a:p>
             <a:pPr algn="ctr" eaLnBrk="1" hangingPunct="1"/>
             <a:r>
-              <a:rPr lang="en-US" altLang="en-US" sz="1200" dirty="0">
+              <a:rPr lang="en-US" altLang="en-US" sz="1000" dirty="0">
                 <a:latin typeface="Arial" panose="020B0604020202020204" pitchFamily="34" charset="0"/>
                 <a:ea typeface="Amazon Ember" panose="020B0603020204020204" pitchFamily="34" charset="0"/>
                 <a:cs typeface="Arial" panose="020B0604020202020204" pitchFamily="34" charset="0"/>
@@ -30671,7 +30605,7 @@
         <p:spPr bwMode="auto">
           <a:xfrm>
             <a:off x="6888565" y="5745150"/>
-            <a:ext cx="2292350" cy="276999"/>
+            <a:ext cx="2292350" cy="246221"/>
           </a:xfrm>
           <a:prstGeom prst="rect">
             <a:avLst/>
@@ -30805,7 +30739,7 @@
           <a:p>
             <a:pPr algn="ctr" eaLnBrk="1" hangingPunct="1"/>
             <a:r>
-              <a:rPr lang="en-US" altLang="en-US" sz="1200" dirty="0">
+              <a:rPr lang="en-US" altLang="en-US" sz="1000" dirty="0">
                 <a:latin typeface="Arial" panose="020B0604020202020204" pitchFamily="34" charset="0"/>
                 <a:ea typeface="Amazon Ember" panose="020B0603020204020204" pitchFamily="34" charset="0"/>
                 <a:cs typeface="Arial" panose="020B0604020202020204" pitchFamily="34" charset="0"/>
@@ -31997,7 +31931,7 @@
         <p:spPr bwMode="auto">
           <a:xfrm>
             <a:off x="4344763" y="5782943"/>
-            <a:ext cx="2243137" cy="461665"/>
+            <a:ext cx="2243137" cy="400110"/>
           </a:xfrm>
           <a:prstGeom prst="rect">
             <a:avLst/>
@@ -32131,7 +32065,7 @@
           <a:p>
             <a:pPr algn="ctr" eaLnBrk="1" hangingPunct="1"/>
             <a:r>
-              <a:rPr lang="en-US" altLang="en-US" sz="1200" dirty="0">
+              <a:rPr lang="en-US" altLang="en-US" sz="1000" dirty="0">
                 <a:latin typeface="Arial" panose="020B0604020202020204" pitchFamily="34" charset="0"/>
                 <a:ea typeface="Amazon Ember" panose="020B0603020204020204" pitchFamily="34" charset="0"/>
                 <a:cs typeface="Arial" panose="020B0604020202020204" pitchFamily="34" charset="0"/>
@@ -32139,14 +32073,14 @@
               <a:t>AWS Directory</a:t>
             </a:r>
             <a:br>
-              <a:rPr lang="en-US" altLang="en-US" sz="1200" dirty="0">
+              <a:rPr lang="en-US" altLang="en-US" sz="1000" dirty="0">
                 <a:latin typeface="Arial" panose="020B0604020202020204" pitchFamily="34" charset="0"/>
                 <a:ea typeface="Amazon Ember" panose="020B0603020204020204" pitchFamily="34" charset="0"/>
                 <a:cs typeface="Arial" panose="020B0604020202020204" pitchFamily="34" charset="0"/>
               </a:rPr>
             </a:br>
             <a:r>
-              <a:rPr lang="en-US" altLang="en-US" sz="1200" dirty="0">
+              <a:rPr lang="en-US" altLang="en-US" sz="1000" dirty="0">
                 <a:latin typeface="Arial" panose="020B0604020202020204" pitchFamily="34" charset="0"/>
                 <a:ea typeface="Amazon Ember" panose="020B0603020204020204" pitchFamily="34" charset="0"/>
                 <a:cs typeface="Arial" panose="020B0604020202020204" pitchFamily="34" charset="0"/>

</xml_diff>